<commit_message>
minor typos in poster
</commit_message>
<xml_diff>
--- a/Poster/229_Poster.pptx
+++ b/Poster/229_Poster.pptx
@@ -12035,12 +12035,12 @@
               <a:t>distortion </a:t>
             </a:r>
             <a:r>
-              <a:rPr lang="en-US" sz="2800" dirty="0" err="1"/>
-              <a:t>metrc</a:t>
+              <a:rPr lang="en-US" sz="2800" dirty="0" smtClean="0"/>
+              <a:t>metric </a:t>
             </a:r>
             <a:r>
               <a:rPr lang="en-US" sz="2800" dirty="0"/>
-              <a:t> (for further constraints on the encoder function)</a:t>
+              <a:t>(for further constraints on the encoder function)</a:t>
             </a:r>
           </a:p>
           <a:p>
@@ -12318,7 +12318,7 @@
           <p:cNvPr id="2" name="Rectangle 1">
             <a:extLst>
               <a:ext uri="{FF2B5EF4-FFF2-40B4-BE49-F238E27FC236}">
-                <a16:creationId xmlns:a16="http://schemas.microsoft.com/office/drawing/2014/main" id="{A73FBCD3-4812-46F5-B0FF-6677DC709A9A}"/>
+                <a16:creationId xmlns:a16="http://schemas.microsoft.com/office/drawing/2014/main" xmlns="" id="{A73FBCD3-4812-46F5-B0FF-6677DC709A9A}"/>
               </a:ext>
             </a:extLst>
           </p:cNvPr>
@@ -12358,7 +12358,7 @@
           <p:cNvPr id="3" name="Rectangle 2">
             <a:extLst>
               <a:ext uri="{FF2B5EF4-FFF2-40B4-BE49-F238E27FC236}">
-                <a16:creationId xmlns:a16="http://schemas.microsoft.com/office/drawing/2014/main" id="{5B6EA0D6-945E-4A95-8550-AB492CF7FE5A}"/>
+                <a16:creationId xmlns:a16="http://schemas.microsoft.com/office/drawing/2014/main" xmlns="" id="{5B6EA0D6-945E-4A95-8550-AB492CF7FE5A}"/>
               </a:ext>
             </a:extLst>
           </p:cNvPr>
@@ -12415,7 +12415,7 @@
           <p:cNvPr id="4" name="Rectangle 3">
             <a:extLst>
               <a:ext uri="{FF2B5EF4-FFF2-40B4-BE49-F238E27FC236}">
-                <a16:creationId xmlns:a16="http://schemas.microsoft.com/office/drawing/2014/main" id="{6D25CF8F-816B-4C5A-9D2A-71487A8751EC}"/>
+                <a16:creationId xmlns:a16="http://schemas.microsoft.com/office/drawing/2014/main" xmlns="" id="{6D25CF8F-816B-4C5A-9D2A-71487A8751EC}"/>
               </a:ext>
             </a:extLst>
           </p:cNvPr>
@@ -12635,7 +12635,7 @@
           <p:cNvPr id="18" name="TextBox 17">
             <a:extLst>
               <a:ext uri="{FF2B5EF4-FFF2-40B4-BE49-F238E27FC236}">
-                <a16:creationId xmlns:a16="http://schemas.microsoft.com/office/drawing/2014/main" id="{600D6531-4208-4B29-AC92-0210C85045CC}"/>
+                <a16:creationId xmlns:a16="http://schemas.microsoft.com/office/drawing/2014/main" xmlns="" id="{600D6531-4208-4B29-AC92-0210C85045CC}"/>
               </a:ext>
             </a:extLst>
           </p:cNvPr>
@@ -12664,12 +12664,16 @@
               <a:t>The All Model entails </a:t>
             </a:r>
             <a:r>
-              <a:rPr lang="en-US" sz="2700" dirty="0" err="1"/>
-              <a:t>Vggnet</a:t>
+              <a:rPr lang="en-US" sz="2700" dirty="0" err="1" smtClean="0"/>
+              <a:t>VGGNet</a:t>
+            </a:r>
+            <a:r>
+              <a:rPr lang="en-US" sz="2700" dirty="0" smtClean="0"/>
+              <a:t> </a:t>
             </a:r>
             <a:r>
               <a:rPr lang="en-US" sz="2700" dirty="0"/>
-              <a:t> with 3 sets of 2 convolutional layers with a </a:t>
+              <a:t>with 3 sets of 2 convolutional layers with a </a:t>
             </a:r>
             <a:r>
               <a:rPr lang="en-US" sz="2700" dirty="0" err="1"/>
@@ -12694,7 +12698,7 @@
           <p:cNvPr id="19" name="TextBox 18">
             <a:extLst>
               <a:ext uri="{FF2B5EF4-FFF2-40B4-BE49-F238E27FC236}">
-                <a16:creationId xmlns:a16="http://schemas.microsoft.com/office/drawing/2014/main" id="{98DEF7AF-6476-4C50-A2AA-61370B95D23B}"/>
+                <a16:creationId xmlns:a16="http://schemas.microsoft.com/office/drawing/2014/main" xmlns="" id="{98DEF7AF-6476-4C50-A2AA-61370B95D23B}"/>
               </a:ext>
             </a:extLst>
           </p:cNvPr>
@@ -12763,7 +12767,7 @@
           <p:cNvPr id="51" name="Picture 50">
             <a:extLst>
               <a:ext uri="{FF2B5EF4-FFF2-40B4-BE49-F238E27FC236}">
-                <a16:creationId xmlns:a16="http://schemas.microsoft.com/office/drawing/2014/main" id="{026ED300-D5BF-456A-BAF3-858FD093D984}"/>
+                <a16:creationId xmlns:a16="http://schemas.microsoft.com/office/drawing/2014/main" xmlns="" id="{026ED300-D5BF-456A-BAF3-858FD093D984}"/>
               </a:ext>
             </a:extLst>
           </p:cNvPr>
@@ -12792,7 +12796,7 @@
           <p:cNvPr id="9" name="Picture 8">
             <a:extLst>
               <a:ext uri="{FF2B5EF4-FFF2-40B4-BE49-F238E27FC236}">
-                <a16:creationId xmlns:a16="http://schemas.microsoft.com/office/drawing/2014/main" id="{F3689EA3-1B83-4627-A36D-B51740384D20}"/>
+                <a16:creationId xmlns:a16="http://schemas.microsoft.com/office/drawing/2014/main" xmlns="" id="{F3689EA3-1B83-4627-A36D-B51740384D20}"/>
               </a:ext>
             </a:extLst>
           </p:cNvPr>
@@ -12822,7 +12826,7 @@
           <p:cNvPr id="10" name="TextBox 9">
             <a:extLst>
               <a:ext uri="{FF2B5EF4-FFF2-40B4-BE49-F238E27FC236}">
-                <a16:creationId xmlns:a16="http://schemas.microsoft.com/office/drawing/2014/main" id="{B6590A8D-629F-46AF-8B62-B4E06D5BA6D6}"/>
+                <a16:creationId xmlns:a16="http://schemas.microsoft.com/office/drawing/2014/main" xmlns="" id="{B6590A8D-629F-46AF-8B62-B4E06D5BA6D6}"/>
               </a:ext>
             </a:extLst>
           </p:cNvPr>
@@ -12857,7 +12861,7 @@
           <p:cNvPr id="5" name="Table 4">
             <a:extLst>
               <a:ext uri="{FF2B5EF4-FFF2-40B4-BE49-F238E27FC236}">
-                <a16:creationId xmlns:a16="http://schemas.microsoft.com/office/drawing/2014/main" id="{A27BDBA2-C2A1-42FA-8A22-036CC69D7FAE}"/>
+                <a16:creationId xmlns:a16="http://schemas.microsoft.com/office/drawing/2014/main" xmlns="" id="{A27BDBA2-C2A1-42FA-8A22-036CC69D7FAE}"/>
               </a:ext>
             </a:extLst>
           </p:cNvPr>
@@ -12886,28 +12890,28 @@
                 <a:gridCol w="3633583">
                   <a:extLst>
                     <a:ext uri="{9D8B030D-6E8A-4147-A177-3AD203B41FA5}">
-                      <a16:colId xmlns:a16="http://schemas.microsoft.com/office/drawing/2014/main" val="2090116508"/>
+                      <a16:colId xmlns:a16="http://schemas.microsoft.com/office/drawing/2014/main" xmlns="" val="2090116508"/>
                     </a:ext>
                   </a:extLst>
                 </a:gridCol>
                 <a:gridCol w="3633583">
                   <a:extLst>
                     <a:ext uri="{9D8B030D-6E8A-4147-A177-3AD203B41FA5}">
-                      <a16:colId xmlns:a16="http://schemas.microsoft.com/office/drawing/2014/main" val="2931110740"/>
+                      <a16:colId xmlns:a16="http://schemas.microsoft.com/office/drawing/2014/main" xmlns="" val="2931110740"/>
                     </a:ext>
                   </a:extLst>
                 </a:gridCol>
                 <a:gridCol w="3633583">
                   <a:extLst>
                     <a:ext uri="{9D8B030D-6E8A-4147-A177-3AD203B41FA5}">
-                      <a16:colId xmlns:a16="http://schemas.microsoft.com/office/drawing/2014/main" val="2141567211"/>
+                      <a16:colId xmlns:a16="http://schemas.microsoft.com/office/drawing/2014/main" xmlns="" val="2141567211"/>
                     </a:ext>
                   </a:extLst>
                 </a:gridCol>
                 <a:gridCol w="3633583">
                   <a:extLst>
                     <a:ext uri="{9D8B030D-6E8A-4147-A177-3AD203B41FA5}">
-                      <a16:colId xmlns:a16="http://schemas.microsoft.com/office/drawing/2014/main" val="2440510473"/>
+                      <a16:colId xmlns:a16="http://schemas.microsoft.com/office/drawing/2014/main" xmlns="" val="2440510473"/>
                     </a:ext>
                   </a:extLst>
                 </a:gridCol>
@@ -12996,7 +13000,7 @@
                 </a:tc>
                 <a:extLst>
                   <a:ext uri="{0D108BD9-81ED-4DB2-BD59-A6C34878D82A}">
-                    <a16:rowId xmlns:a16="http://schemas.microsoft.com/office/drawing/2014/main" val="850367266"/>
+                    <a16:rowId xmlns:a16="http://schemas.microsoft.com/office/drawing/2014/main" xmlns="" val="850367266"/>
                   </a:ext>
                 </a:extLst>
               </a:tr>
@@ -13066,7 +13070,7 @@
                 </a:tc>
                 <a:extLst>
                   <a:ext uri="{0D108BD9-81ED-4DB2-BD59-A6C34878D82A}">
-                    <a16:rowId xmlns:a16="http://schemas.microsoft.com/office/drawing/2014/main" val="3202414890"/>
+                    <a16:rowId xmlns:a16="http://schemas.microsoft.com/office/drawing/2014/main" xmlns="" val="3202414890"/>
                   </a:ext>
                 </a:extLst>
               </a:tr>
@@ -13136,7 +13140,7 @@
                 </a:tc>
                 <a:extLst>
                   <a:ext uri="{0D108BD9-81ED-4DB2-BD59-A6C34878D82A}">
-                    <a16:rowId xmlns:a16="http://schemas.microsoft.com/office/drawing/2014/main" val="1916690347"/>
+                    <a16:rowId xmlns:a16="http://schemas.microsoft.com/office/drawing/2014/main" xmlns="" val="1916690347"/>
                   </a:ext>
                 </a:extLst>
               </a:tr>
@@ -13149,7 +13153,7 @@
           <p:cNvPr id="12" name="Picture 11">
             <a:extLst>
               <a:ext uri="{FF2B5EF4-FFF2-40B4-BE49-F238E27FC236}">
-                <a16:creationId xmlns:a16="http://schemas.microsoft.com/office/drawing/2014/main" id="{4E996446-0C77-449A-8F35-858D828AD217}"/>
+                <a16:creationId xmlns:a16="http://schemas.microsoft.com/office/drawing/2014/main" xmlns="" id="{4E996446-0C77-449A-8F35-858D828AD217}"/>
               </a:ext>
             </a:extLst>
           </p:cNvPr>
@@ -13179,7 +13183,7 @@
           <p:cNvPr id="14" name="Picture 13">
             <a:extLst>
               <a:ext uri="{FF2B5EF4-FFF2-40B4-BE49-F238E27FC236}">
-                <a16:creationId xmlns:a16="http://schemas.microsoft.com/office/drawing/2014/main" id="{7C88825A-77FD-43DB-8F55-9608A5172700}"/>
+                <a16:creationId xmlns:a16="http://schemas.microsoft.com/office/drawing/2014/main" xmlns="" id="{7C88825A-77FD-43DB-8F55-9608A5172700}"/>
               </a:ext>
             </a:extLst>
           </p:cNvPr>
@@ -13209,7 +13213,7 @@
           <p:cNvPr id="20" name="Picture 19">
             <a:extLst>
               <a:ext uri="{FF2B5EF4-FFF2-40B4-BE49-F238E27FC236}">
-                <a16:creationId xmlns:a16="http://schemas.microsoft.com/office/drawing/2014/main" id="{17D18A3B-B5BF-4025-8A62-250D6BF60464}"/>
+                <a16:creationId xmlns:a16="http://schemas.microsoft.com/office/drawing/2014/main" xmlns="" id="{17D18A3B-B5BF-4025-8A62-250D6BF60464}"/>
               </a:ext>
             </a:extLst>
           </p:cNvPr>
@@ -13239,7 +13243,7 @@
           <p:cNvPr id="23" name="Picture 22">
             <a:extLst>
               <a:ext uri="{FF2B5EF4-FFF2-40B4-BE49-F238E27FC236}">
-                <a16:creationId xmlns:a16="http://schemas.microsoft.com/office/drawing/2014/main" id="{328E86F7-D73F-42D3-AE6D-58856ABC2BDB}"/>
+                <a16:creationId xmlns:a16="http://schemas.microsoft.com/office/drawing/2014/main" xmlns="" id="{328E86F7-D73F-42D3-AE6D-58856ABC2BDB}"/>
               </a:ext>
             </a:extLst>
           </p:cNvPr>
@@ -13269,7 +13273,7 @@
           <p:cNvPr id="24" name="TextBox 23">
             <a:extLst>
               <a:ext uri="{FF2B5EF4-FFF2-40B4-BE49-F238E27FC236}">
-                <a16:creationId xmlns:a16="http://schemas.microsoft.com/office/drawing/2014/main" id="{DFB4F5CA-50D0-4FF6-BA93-B0731DF60E2E}"/>
+                <a16:creationId xmlns:a16="http://schemas.microsoft.com/office/drawing/2014/main" xmlns="" id="{DFB4F5CA-50D0-4FF6-BA93-B0731DF60E2E}"/>
               </a:ext>
             </a:extLst>
           </p:cNvPr>
@@ -13308,7 +13312,7 @@
           <p:cNvPr id="48" name="TextBox 47">
             <a:extLst>
               <a:ext uri="{FF2B5EF4-FFF2-40B4-BE49-F238E27FC236}">
-                <a16:creationId xmlns:a16="http://schemas.microsoft.com/office/drawing/2014/main" id="{50A384EF-2519-4C45-972C-4C74A5FCF03B}"/>
+                <a16:creationId xmlns:a16="http://schemas.microsoft.com/office/drawing/2014/main" xmlns="" id="{50A384EF-2519-4C45-972C-4C74A5FCF03B}"/>
               </a:ext>
             </a:extLst>
           </p:cNvPr>
@@ -13347,7 +13351,7 @@
           <p:cNvPr id="49" name="TextBox 48">
             <a:extLst>
               <a:ext uri="{FF2B5EF4-FFF2-40B4-BE49-F238E27FC236}">
-                <a16:creationId xmlns:a16="http://schemas.microsoft.com/office/drawing/2014/main" id="{865764A4-5670-4E83-9746-8C5DCC498B3A}"/>
+                <a16:creationId xmlns:a16="http://schemas.microsoft.com/office/drawing/2014/main" xmlns="" id="{865764A4-5670-4E83-9746-8C5DCC498B3A}"/>
               </a:ext>
             </a:extLst>
           </p:cNvPr>
@@ -13386,7 +13390,7 @@
           <p:cNvPr id="50" name="TextBox 49">
             <a:extLst>
               <a:ext uri="{FF2B5EF4-FFF2-40B4-BE49-F238E27FC236}">
-                <a16:creationId xmlns:a16="http://schemas.microsoft.com/office/drawing/2014/main" id="{A6BBBB29-9E5F-4BF4-8396-E65F948879F5}"/>
+                <a16:creationId xmlns:a16="http://schemas.microsoft.com/office/drawing/2014/main" xmlns="" id="{A6BBBB29-9E5F-4BF4-8396-E65F948879F5}"/>
               </a:ext>
             </a:extLst>
           </p:cNvPr>

</xml_diff>

<commit_message>
Make pretty. Add words
</commit_message>
<xml_diff>
--- a/Poster/229_Poster.pptx
+++ b/Poster/229_Poster.pptx
@@ -10135,64 +10135,6 @@
       </p:grpSpPr>
       <p:sp>
         <p:nvSpPr>
-          <p:cNvPr id="10" name="Shape 10"/>
-          <p:cNvSpPr/>
-          <p:nvPr/>
-        </p:nvSpPr>
-        <p:spPr>
-          <a:xfrm>
-            <a:off x="1" y="0"/>
-            <a:ext cx="32984235" cy="883311"/>
-          </a:xfrm>
-          <a:prstGeom prst="rect">
-            <a:avLst/>
-          </a:prstGeom>
-          <a:solidFill>
-            <a:schemeClr val="lt1"/>
-          </a:solidFill>
-          <a:ln w="9525" cap="flat" cmpd="sng">
-            <a:solidFill>
-              <a:schemeClr val="dk1"/>
-            </a:solidFill>
-            <a:prstDash val="solid"/>
-            <a:round/>
-            <a:headEnd type="none" w="med" len="med"/>
-            <a:tailEnd type="none" w="med" len="med"/>
-          </a:ln>
-          <a:effectLst>
-            <a:outerShdw blurRad="127000" dist="50800" dir="5400000" rotWithShape="0">
-              <a:srgbClr val="000000">
-                <a:alpha val="24705"/>
-              </a:srgbClr>
-            </a:outerShdw>
-          </a:effectLst>
-        </p:spPr>
-        <p:txBody>
-          <a:bodyPr lIns="91425" tIns="45700" rIns="91425" bIns="45700" anchor="ctr" anchorCtr="0">
-            <a:noAutofit/>
-          </a:bodyPr>
-          <a:lstStyle/>
-          <a:p>
-            <a:pPr marL="0" marR="0" lvl="0" indent="0" algn="ctr" rtl="0">
-              <a:spcBef>
-                <a:spcPts val="0"/>
-              </a:spcBef>
-              <a:buNone/>
-            </a:pPr>
-            <a:endParaRPr sz="7408" b="0" i="0" u="none" strike="noStrike" cap="none">
-              <a:solidFill>
-                <a:schemeClr val="lt1"/>
-              </a:solidFill>
-              <a:latin typeface="Calibri"/>
-              <a:ea typeface="Calibri"/>
-              <a:cs typeface="Calibri"/>
-              <a:sym typeface="Calibri"/>
-            </a:endParaRPr>
-          </a:p>
-        </p:txBody>
-      </p:sp>
-      <p:sp>
-        <p:nvSpPr>
           <p:cNvPr id="11" name="Shape 11"/>
           <p:cNvSpPr/>
           <p:nvPr/>
@@ -10249,114 +10191,6 @@
           </a:p>
         </p:txBody>
       </p:sp>
-      <p:pic>
-        <p:nvPicPr>
-          <p:cNvPr id="12" name="Shape 12"/>
-          <p:cNvPicPr preferRelativeResize="0"/>
-          <p:nvPr/>
-        </p:nvPicPr>
-        <p:blipFill rotWithShape="1">
-          <a:blip r:embed="rId13">
-            <a:alphaModFix/>
-          </a:blip>
-          <a:srcRect/>
-          <a:stretch/>
-        </p:blipFill>
-        <p:spPr>
-          <a:xfrm>
-            <a:off x="38301" y="22047"/>
-            <a:ext cx="5994398" cy="839215"/>
-          </a:xfrm>
-          <a:prstGeom prst="rect">
-            <a:avLst/>
-          </a:prstGeom>
-          <a:noFill/>
-          <a:ln>
-            <a:noFill/>
-          </a:ln>
-        </p:spPr>
-      </p:pic>
-      <p:pic>
-        <p:nvPicPr>
-          <p:cNvPr id="13" name="Shape 13"/>
-          <p:cNvPicPr preferRelativeResize="0"/>
-          <p:nvPr/>
-        </p:nvPicPr>
-        <p:blipFill rotWithShape="1">
-          <a:blip r:embed="rId14">
-            <a:alphaModFix/>
-          </a:blip>
-          <a:srcRect/>
-          <a:stretch/>
-        </p:blipFill>
-        <p:spPr>
-          <a:xfrm>
-            <a:off x="30513262" y="17499"/>
-            <a:ext cx="2448230" cy="851558"/>
-          </a:xfrm>
-          <a:prstGeom prst="rect">
-            <a:avLst/>
-          </a:prstGeom>
-          <a:noFill/>
-          <a:ln>
-            <a:noFill/>
-          </a:ln>
-        </p:spPr>
-      </p:pic>
-      <p:pic>
-        <p:nvPicPr>
-          <p:cNvPr id="14" name="Shape 14"/>
-          <p:cNvPicPr preferRelativeResize="0"/>
-          <p:nvPr/>
-        </p:nvPicPr>
-        <p:blipFill rotWithShape="1">
-          <a:blip r:embed="rId15">
-            <a:alphaModFix/>
-          </a:blip>
-          <a:srcRect/>
-          <a:stretch/>
-        </p:blipFill>
-        <p:spPr>
-          <a:xfrm>
-            <a:off x="29673556" y="17499"/>
-            <a:ext cx="839707" cy="839707"/>
-          </a:xfrm>
-          <a:prstGeom prst="rect">
-            <a:avLst/>
-          </a:prstGeom>
-          <a:noFill/>
-          <a:ln>
-            <a:noFill/>
-          </a:ln>
-        </p:spPr>
-      </p:pic>
-      <p:pic>
-        <p:nvPicPr>
-          <p:cNvPr id="15" name="Shape 15" descr="doewhite.pdf"/>
-          <p:cNvPicPr preferRelativeResize="0"/>
-          <p:nvPr/>
-        </p:nvPicPr>
-        <p:blipFill rotWithShape="1">
-          <a:blip r:embed="rId16">
-            <a:alphaModFix/>
-          </a:blip>
-          <a:srcRect/>
-          <a:stretch/>
-        </p:blipFill>
-        <p:spPr>
-          <a:xfrm>
-            <a:off x="29581590" y="21078751"/>
-            <a:ext cx="3271639" cy="821128"/>
-          </a:xfrm>
-          <a:prstGeom prst="rect">
-            <a:avLst/>
-          </a:prstGeom>
-          <a:noFill/>
-          <a:ln>
-            <a:noFill/>
-          </a:ln>
-        </p:spPr>
-      </p:pic>
     </p:spTree>
   </p:cSld>
   <p:clrMap bg1="lt1" tx1="dk1" bg2="dk2" tx2="lt2" accent1="accent1" accent2="accent2" accent3="accent3" accent4="accent4" accent5="accent5" accent6="accent6" hlink="hlink" folHlink="folHlink"/>
@@ -10950,8 +10784,29 @@
                 <a:cs typeface="Calibri"/>
                 <a:sym typeface="Calibri"/>
               </a:rPr>
-              <a:t>   Application Testing of Generative Adversarial Privacy</a:t>
+              <a:t>   </a:t>
             </a:r>
+            <a:r>
+              <a:rPr lang="en-US" sz="8800" b="0" i="0" u="none" strike="noStrike" cap="none" dirty="0">
+                <a:solidFill>
+                  <a:schemeClr val="lt1"/>
+                </a:solidFill>
+                <a:latin typeface="Lato" panose="020F0502020204030203" pitchFamily="34" charset="0"/>
+                <a:ea typeface="Lato" panose="020F0502020204030203" pitchFamily="34" charset="0"/>
+                <a:cs typeface="Lato" panose="020F0502020204030203" pitchFamily="34" charset="0"/>
+                <a:sym typeface="Calibri"/>
+              </a:rPr>
+              <a:t>Application Testing of Generative Adversarial Privacy</a:t>
+            </a:r>
+            <a:endParaRPr lang="en-US" sz="9600" b="0" i="0" u="none" strike="noStrike" cap="none" dirty="0">
+              <a:solidFill>
+                <a:schemeClr val="lt1"/>
+              </a:solidFill>
+              <a:latin typeface="Lato" panose="020F0502020204030203" pitchFamily="34" charset="0"/>
+              <a:ea typeface="Lato" panose="020F0502020204030203" pitchFamily="34" charset="0"/>
+              <a:cs typeface="Lato" panose="020F0502020204030203" pitchFamily="34" charset="0"/>
+              <a:sym typeface="Calibri"/>
+            </a:endParaRPr>
           </a:p>
         </p:txBody>
       </p:sp>
@@ -11097,9 +10952,9 @@
                 <a:solidFill>
                   <a:schemeClr val="dk1"/>
                 </a:solidFill>
-                <a:latin typeface="Calibri"/>
-                <a:ea typeface="Calibri"/>
-                <a:cs typeface="Calibri"/>
+                <a:latin typeface="Lato" panose="020F0502020204030203" pitchFamily="34" charset="0"/>
+                <a:ea typeface="Lato" panose="020F0502020204030203" pitchFamily="34" charset="0"/>
+                <a:cs typeface="Lato" panose="020F0502020204030203" pitchFamily="34" charset="0"/>
                 <a:sym typeface="Calibri"/>
               </a:rPr>
               <a:t>Background and Motivation</a:t>
@@ -11242,9 +11097,9 @@
                 <a:solidFill>
                   <a:schemeClr val="dk1"/>
                 </a:solidFill>
-                <a:latin typeface="Calibri"/>
-                <a:ea typeface="Calibri"/>
-                <a:cs typeface="Calibri"/>
+                <a:latin typeface="Lato" panose="020F0502020204030203" pitchFamily="34" charset="0"/>
+                <a:ea typeface="Lato" panose="020F0502020204030203" pitchFamily="34" charset="0"/>
+                <a:cs typeface="Lato" panose="020F0502020204030203" pitchFamily="34" charset="0"/>
                 <a:sym typeface="Calibri"/>
               </a:rPr>
               <a:t>Problem Statement</a:t>
@@ -11343,9 +11198,9 @@
                 <a:solidFill>
                   <a:schemeClr val="dk1"/>
                 </a:solidFill>
-                <a:latin typeface="Calibri"/>
-                <a:ea typeface="Calibri"/>
-                <a:cs typeface="Calibri"/>
+                <a:latin typeface="Lato" panose="020F0502020204030203" pitchFamily="34" charset="0"/>
+                <a:ea typeface="Lato" panose="020F0502020204030203" pitchFamily="34" charset="0"/>
+                <a:cs typeface="Lato" panose="020F0502020204030203" pitchFamily="34" charset="0"/>
                 <a:sym typeface="Calibri"/>
               </a:rPr>
               <a:t>Data Preprocessing</a:t>
@@ -11354,9 +11209,9 @@
               <a:solidFill>
                 <a:schemeClr val="dk1"/>
               </a:solidFill>
-              <a:latin typeface="Gill Sans"/>
-              <a:ea typeface="Gill Sans"/>
-              <a:cs typeface="Gill Sans"/>
+              <a:latin typeface="Lato" panose="020F0502020204030203" pitchFamily="34" charset="0"/>
+              <a:ea typeface="Lato" panose="020F0502020204030203" pitchFamily="34" charset="0"/>
+              <a:cs typeface="Lato" panose="020F0502020204030203" pitchFamily="34" charset="0"/>
               <a:sym typeface="Gill Sans"/>
             </a:endParaRPr>
           </a:p>
@@ -11399,9 +11254,9 @@
                 <a:solidFill>
                   <a:schemeClr val="dk1"/>
                 </a:solidFill>
-                <a:latin typeface="Gill Sans"/>
-                <a:ea typeface="Gill Sans"/>
-                <a:cs typeface="Gill Sans"/>
+                <a:latin typeface="Lato" panose="020F0502020204030203" pitchFamily="34" charset="0"/>
+                <a:ea typeface="Lato" panose="020F0502020204030203" pitchFamily="34" charset="0"/>
+                <a:cs typeface="Lato" panose="020F0502020204030203" pitchFamily="34" charset="0"/>
                 <a:sym typeface="Gill Sans"/>
               </a:rPr>
               <a:t>References</a:t>
@@ -11504,9 +11359,9 @@
                 <a:solidFill>
                   <a:schemeClr val="dk1"/>
                 </a:solidFill>
-                <a:latin typeface="Gill Sans"/>
-                <a:ea typeface="Gill Sans"/>
-                <a:cs typeface="Gill Sans"/>
+                <a:latin typeface="Lato" panose="020F0502020204030203" pitchFamily="34" charset="0"/>
+                <a:ea typeface="Lato" panose="020F0502020204030203" pitchFamily="34" charset="0"/>
+                <a:cs typeface="Lato" panose="020F0502020204030203" pitchFamily="34" charset="0"/>
                 <a:sym typeface="Gill Sans"/>
               </a:rPr>
               <a:t>The Model</a:t>
@@ -11551,9 +11406,9 @@
                 <a:solidFill>
                   <a:schemeClr val="dk1"/>
                 </a:solidFill>
-                <a:latin typeface="Gill Sans"/>
-                <a:ea typeface="Gill Sans"/>
-                <a:cs typeface="Gill Sans"/>
+                <a:latin typeface="Lato" panose="020F0502020204030203" pitchFamily="34" charset="0"/>
+                <a:ea typeface="Lato" panose="020F0502020204030203" pitchFamily="34" charset="0"/>
+                <a:cs typeface="Lato" panose="020F0502020204030203" pitchFamily="34" charset="0"/>
                 <a:sym typeface="Gill Sans"/>
               </a:rPr>
               <a:t>Results and Discussion</a:t>
@@ -11656,109 +11511,13 @@
                 <a:solidFill>
                   <a:schemeClr val="dk1"/>
                 </a:solidFill>
-                <a:latin typeface="Gill Sans"/>
-                <a:ea typeface="Gill Sans"/>
-                <a:cs typeface="Gill Sans"/>
+                <a:latin typeface="Lato" panose="020F0502020204030203" pitchFamily="34" charset="0"/>
+                <a:ea typeface="Lato" panose="020F0502020204030203" pitchFamily="34" charset="0"/>
+                <a:cs typeface="Lato" panose="020F0502020204030203" pitchFamily="34" charset="0"/>
                 <a:sym typeface="Gill Sans"/>
               </a:rPr>
               <a:t>Future Work</a:t>
             </a:r>
-          </a:p>
-        </p:txBody>
-      </p:sp>
-      <p:sp>
-        <p:nvSpPr>
-          <p:cNvPr id="109" name="Shape 109"/>
-          <p:cNvSpPr/>
-          <p:nvPr/>
-        </p:nvSpPr>
-        <p:spPr>
-          <a:xfrm>
-            <a:off x="132734" y="20986956"/>
-            <a:ext cx="32756169" cy="910114"/>
-          </a:xfrm>
-          <a:prstGeom prst="rect">
-            <a:avLst/>
-          </a:prstGeom>
-          <a:solidFill>
-            <a:srgbClr val="C00000"/>
-          </a:solidFill>
-          <a:ln w="9525" cap="flat" cmpd="sng">
-            <a:solidFill>
-              <a:srgbClr val="32698B"/>
-            </a:solidFill>
-            <a:prstDash val="solid"/>
-            <a:round/>
-            <a:headEnd type="none" w="med" len="med"/>
-            <a:tailEnd type="none" w="med" len="med"/>
-          </a:ln>
-        </p:spPr>
-        <p:txBody>
-          <a:bodyPr lIns="91425" tIns="45700" rIns="91425" bIns="45700" anchor="ctr" anchorCtr="0">
-            <a:noAutofit/>
-          </a:bodyPr>
-          <a:lstStyle/>
-          <a:p>
-            <a:pPr marL="0" marR="0" lvl="0" indent="0" algn="ctr" rtl="0">
-              <a:spcBef>
-                <a:spcPts val="0"/>
-              </a:spcBef>
-              <a:buNone/>
-            </a:pPr>
-            <a:endParaRPr sz="7199">
-              <a:solidFill>
-                <a:schemeClr val="lt1"/>
-              </a:solidFill>
-              <a:latin typeface="Calibri"/>
-              <a:ea typeface="Calibri"/>
-              <a:cs typeface="Calibri"/>
-              <a:sym typeface="Calibri"/>
-            </a:endParaRPr>
-          </a:p>
-        </p:txBody>
-      </p:sp>
-      <p:sp>
-        <p:nvSpPr>
-          <p:cNvPr id="110" name="Shape 110"/>
-          <p:cNvSpPr/>
-          <p:nvPr/>
-        </p:nvSpPr>
-        <p:spPr>
-          <a:xfrm>
-            <a:off x="0" y="8486"/>
-            <a:ext cx="32977389" cy="859445"/>
-          </a:xfrm>
-          <a:prstGeom prst="rect">
-            <a:avLst/>
-          </a:prstGeom>
-          <a:solidFill>
-            <a:srgbClr val="C00000"/>
-          </a:solidFill>
-          <a:ln>
-            <a:noFill/>
-          </a:ln>
-        </p:spPr>
-        <p:txBody>
-          <a:bodyPr lIns="91425" tIns="45700" rIns="91425" bIns="45700" anchor="ctr" anchorCtr="0">
-            <a:noAutofit/>
-          </a:bodyPr>
-          <a:lstStyle/>
-          <a:p>
-            <a:pPr marL="0" marR="0" lvl="0" indent="0" algn="ctr" rtl="0">
-              <a:spcBef>
-                <a:spcPts val="0"/>
-              </a:spcBef>
-              <a:buNone/>
-            </a:pPr>
-            <a:endParaRPr sz="7199">
-              <a:solidFill>
-                <a:schemeClr val="lt1"/>
-              </a:solidFill>
-              <a:latin typeface="Calibri"/>
-              <a:ea typeface="Calibri"/>
-              <a:cs typeface="Calibri"/>
-              <a:sym typeface="Calibri"/>
-            </a:endParaRPr>
           </a:p>
         </p:txBody>
       </p:sp>
@@ -11836,20 +11595,20 @@
               <a:buChar char="•"/>
             </a:pPr>
             <a:r>
-              <a:rPr lang="en-US" sz="2800" b="1" dirty="0"/>
+              <a:rPr lang="en-US" sz="2800" b="1" dirty="0">
+                <a:latin typeface="Lato" panose="020F0502020204030203" pitchFamily="34" charset="0"/>
+                <a:ea typeface="Lato" panose="020F0502020204030203" pitchFamily="34" charset="0"/>
+                <a:cs typeface="Lato" panose="020F0502020204030203" pitchFamily="34" charset="0"/>
+              </a:rPr>
               <a:t>Reshaped</a:t>
             </a:r>
             <a:r>
-              <a:rPr lang="en-US" sz="2800" dirty="0"/>
-              <a:t> them all to 256 x 256 (avg. size dataset) pixels with </a:t>
-            </a:r>
-            <a:r>
-              <a:rPr lang="en-US" sz="2800" b="1" dirty="0"/>
-              <a:t>3 color </a:t>
-            </a:r>
-            <a:r>
-              <a:rPr lang="en-US" sz="2800" dirty="0"/>
-              <a:t>channels </a:t>
+              <a:rPr lang="en-US" sz="2800" dirty="0">
+                <a:latin typeface="Lato" panose="020F0502020204030203" pitchFamily="34" charset="0"/>
+                <a:ea typeface="Lato" panose="020F0502020204030203" pitchFamily="34" charset="0"/>
+                <a:cs typeface="Lato" panose="020F0502020204030203" pitchFamily="34" charset="0"/>
+              </a:rPr>
+              <a:t> images to 256 pixels x 256 pixels x 3 colors (avg. image size of the dataset) </a:t>
             </a:r>
           </a:p>
           <a:p>
@@ -11859,46 +11618,22 @@
             </a:pPr>
             <a:r>
               <a:rPr lang="en-US" sz="2700" b="1" dirty="0">
-                <a:latin typeface="+mj-lt"/>
-                <a:ea typeface="Calibri"/>
-                <a:cs typeface="Calibri"/>
+                <a:latin typeface="Lato" panose="020F0502020204030203" pitchFamily="34" charset="0"/>
+                <a:ea typeface="Lato" panose="020F0502020204030203" pitchFamily="34" charset="0"/>
+                <a:cs typeface="Lato" panose="020F0502020204030203" pitchFamily="34" charset="0"/>
                 <a:sym typeface="Calibri"/>
               </a:rPr>
               <a:t>Gender and Smile Data</a:t>
             </a:r>
             <a:r>
               <a:rPr lang="en-US" sz="2700" dirty="0">
-                <a:latin typeface="+mj-lt"/>
-                <a:ea typeface="Calibri"/>
-                <a:cs typeface="Calibri"/>
+                <a:latin typeface="Lato" panose="020F0502020204030203" pitchFamily="34" charset="0"/>
+                <a:ea typeface="Lato" panose="020F0502020204030203" pitchFamily="34" charset="0"/>
+                <a:cs typeface="Lato" panose="020F0502020204030203" pitchFamily="34" charset="0"/>
                 <a:sym typeface="Calibri"/>
               </a:rPr>
-              <a:t>: cleaned labels to be 0 and 1 ({smile, no smile}, {male, </a:t>
+              <a:t>: cleaned labels to be 0 and 1 ({smile, no smile}, {male, female})</a:t>
             </a:r>
-            <a:r>
-              <a:rPr lang="en-US" sz="2700">
-                <a:latin typeface="+mj-lt"/>
-                <a:ea typeface="Calibri"/>
-                <a:cs typeface="Calibri"/>
-                <a:sym typeface="Calibri"/>
-              </a:rPr>
-              <a:t>female</a:t>
-            </a:r>
-            <a:r>
-              <a:rPr lang="en-US" sz="2700" smtClean="0">
-                <a:latin typeface="+mj-lt"/>
-                <a:ea typeface="Calibri"/>
-                <a:cs typeface="Calibri"/>
-                <a:sym typeface="Calibri"/>
-              </a:rPr>
-              <a:t>})</a:t>
-            </a:r>
-            <a:endParaRPr lang="en-US" sz="2700" dirty="0">
-              <a:latin typeface="+mj-lt"/>
-              <a:ea typeface="Calibri"/>
-              <a:cs typeface="Calibri"/>
-              <a:sym typeface="Calibri"/>
-            </a:endParaRPr>
           </a:p>
         </p:txBody>
       </p:sp>
@@ -11938,9 +11673,9 @@
                 <a:solidFill>
                   <a:schemeClr val="dk1"/>
                 </a:solidFill>
-                <a:latin typeface="+mn-lt"/>
-                <a:ea typeface="Calibri"/>
-                <a:cs typeface="Calibri"/>
+                <a:latin typeface="Lato" panose="020F0502020204030203" pitchFamily="34" charset="0"/>
+                <a:ea typeface="Lato" panose="020F0502020204030203" pitchFamily="34" charset="0"/>
+                <a:cs typeface="Lato" panose="020F0502020204030203" pitchFamily="34" charset="0"/>
                 <a:sym typeface="Calibri"/>
               </a:rPr>
               <a:t>Methods</a:t>
@@ -11950,9 +11685,9 @@
                 <a:solidFill>
                   <a:schemeClr val="dk1"/>
                 </a:solidFill>
-                <a:latin typeface="+mn-lt"/>
-                <a:ea typeface="Calibri"/>
-                <a:cs typeface="Calibri"/>
+                <a:latin typeface="Lato" panose="020F0502020204030203" pitchFamily="34" charset="0"/>
+                <a:ea typeface="Lato" panose="020F0502020204030203" pitchFamily="34" charset="0"/>
+                <a:cs typeface="Lato" panose="020F0502020204030203" pitchFamily="34" charset="0"/>
                 <a:sym typeface="Calibri"/>
               </a:rPr>
               <a:t>: </a:t>
@@ -11961,9 +11696,9 @@
               <a:solidFill>
                 <a:schemeClr val="dk1"/>
               </a:solidFill>
-              <a:latin typeface="+mn-lt"/>
-              <a:ea typeface="Calibri"/>
-              <a:cs typeface="Calibri"/>
+              <a:latin typeface="Lato" panose="020F0502020204030203" pitchFamily="34" charset="0"/>
+              <a:ea typeface="Lato" panose="020F0502020204030203" pitchFamily="34" charset="0"/>
+              <a:cs typeface="Lato" panose="020F0502020204030203" pitchFamily="34" charset="0"/>
               <a:sym typeface="Calibri"/>
             </a:endParaRPr>
           </a:p>
@@ -11977,27 +11712,51 @@
               <a:buChar char="•"/>
             </a:pPr>
             <a:r>
-              <a:rPr lang="en-US" sz="2800" b="1" dirty="0"/>
+              <a:rPr lang="en-US" sz="2800" b="1" dirty="0">
+                <a:latin typeface="Lato" panose="020F0502020204030203" pitchFamily="34" charset="0"/>
+                <a:ea typeface="Lato" panose="020F0502020204030203" pitchFamily="34" charset="0"/>
+                <a:cs typeface="Lato" panose="020F0502020204030203" pitchFamily="34" charset="0"/>
+              </a:rPr>
               <a:t>E</a:t>
             </a:r>
             <a:r>
-              <a:rPr lang="en-US" sz="2800" dirty="0"/>
+              <a:rPr lang="en-US" sz="2800" dirty="0">
+                <a:latin typeface="Lato" panose="020F0502020204030203" pitchFamily="34" charset="0"/>
+                <a:ea typeface="Lato" panose="020F0502020204030203" pitchFamily="34" charset="0"/>
+                <a:cs typeface="Lato" panose="020F0502020204030203" pitchFamily="34" charset="0"/>
+              </a:rPr>
               <a:t>,</a:t>
             </a:r>
             <a:r>
-              <a:rPr lang="en-US" sz="2800" b="1" dirty="0"/>
+              <a:rPr lang="en-US" sz="2800" b="1" dirty="0">
+                <a:latin typeface="Lato" panose="020F0502020204030203" pitchFamily="34" charset="0"/>
+                <a:ea typeface="Lato" panose="020F0502020204030203" pitchFamily="34" charset="0"/>
+                <a:cs typeface="Lato" panose="020F0502020204030203" pitchFamily="34" charset="0"/>
+              </a:rPr>
               <a:t>G</a:t>
             </a:r>
             <a:r>
-              <a:rPr lang="en-US" sz="2800" dirty="0"/>
+              <a:rPr lang="en-US" sz="2800" dirty="0">
+                <a:latin typeface="Lato" panose="020F0502020204030203" pitchFamily="34" charset="0"/>
+                <a:ea typeface="Lato" panose="020F0502020204030203" pitchFamily="34" charset="0"/>
+                <a:cs typeface="Lato" panose="020F0502020204030203" pitchFamily="34" charset="0"/>
+              </a:rPr>
               <a:t>,</a:t>
             </a:r>
             <a:r>
-              <a:rPr lang="en-US" sz="2800" b="1" dirty="0"/>
+              <a:rPr lang="en-US" sz="2800" b="1" dirty="0">
+                <a:latin typeface="Lato" panose="020F0502020204030203" pitchFamily="34" charset="0"/>
+                <a:ea typeface="Lato" panose="020F0502020204030203" pitchFamily="34" charset="0"/>
+                <a:cs typeface="Lato" panose="020F0502020204030203" pitchFamily="34" charset="0"/>
+              </a:rPr>
               <a:t>S:</a:t>
             </a:r>
             <a:r>
-              <a:rPr lang="en-US" sz="2800" dirty="0"/>
+              <a:rPr lang="en-US" sz="2800" dirty="0">
+                <a:latin typeface="Lato" panose="020F0502020204030203" pitchFamily="34" charset="0"/>
+                <a:ea typeface="Lato" panose="020F0502020204030203" pitchFamily="34" charset="0"/>
+                <a:cs typeface="Lato" panose="020F0502020204030203" pitchFamily="34" charset="0"/>
+              </a:rPr>
               <a:t> for encoder, gender classifier, and smile classifier respectively</a:t>
             </a:r>
           </a:p>
@@ -12011,20 +11770,20 @@
               <a:buChar char="•"/>
             </a:pPr>
             <a:r>
-              <a:rPr lang="en-US" sz="2800" b="1" dirty="0"/>
+              <a:rPr lang="en-US" sz="2800" b="1" dirty="0">
+                <a:latin typeface="Lato" panose="020F0502020204030203" pitchFamily="34" charset="0"/>
+                <a:ea typeface="Lato" panose="020F0502020204030203" pitchFamily="34" charset="0"/>
+                <a:cs typeface="Lato" panose="020F0502020204030203" pitchFamily="34" charset="0"/>
+              </a:rPr>
               <a:t>D: </a:t>
             </a:r>
             <a:r>
-              <a:rPr lang="en-US" sz="2800" dirty="0"/>
-              <a:t>distortion </a:t>
-            </a:r>
-            <a:r>
-              <a:rPr lang="en-US" sz="2800" dirty="0" smtClean="0"/>
-              <a:t>metric </a:t>
-            </a:r>
-            <a:r>
-              <a:rPr lang="en-US" sz="2800" dirty="0"/>
-              <a:t>(for further constraints on the encoder function)</a:t>
+              <a:rPr lang="en-US" sz="2800" dirty="0">
+                <a:latin typeface="Lato" panose="020F0502020204030203" pitchFamily="34" charset="0"/>
+                <a:ea typeface="Lato" panose="020F0502020204030203" pitchFamily="34" charset="0"/>
+                <a:cs typeface="Lato" panose="020F0502020204030203" pitchFamily="34" charset="0"/>
+              </a:rPr>
+              <a:t>distortion metric (for further constraints on the encoder function)</a:t>
             </a:r>
           </a:p>
           <a:p>
@@ -12037,15 +11796,27 @@
               <a:buChar char="•"/>
             </a:pPr>
             <a:r>
-              <a:rPr lang="en-US" sz="2800" dirty="0"/>
+              <a:rPr lang="en-US" sz="2800" dirty="0">
+                <a:latin typeface="Lato" panose="020F0502020204030203" pitchFamily="34" charset="0"/>
+                <a:ea typeface="Lato" panose="020F0502020204030203" pitchFamily="34" charset="0"/>
+                <a:cs typeface="Lato" panose="020F0502020204030203" pitchFamily="34" charset="0"/>
+              </a:rPr>
               <a:t> </a:t>
             </a:r>
             <a:r>
-              <a:rPr lang="en-US" sz="2800" b="1" dirty="0"/>
+              <a:rPr lang="en-US" sz="2800" b="1" dirty="0">
+                <a:latin typeface="Lato" panose="020F0502020204030203" pitchFamily="34" charset="0"/>
+                <a:ea typeface="Lato" panose="020F0502020204030203" pitchFamily="34" charset="0"/>
+                <a:cs typeface="Lato" panose="020F0502020204030203" pitchFamily="34" charset="0"/>
+              </a:rPr>
               <a:t>GAP architecture: </a:t>
             </a:r>
             <a:r>
-              <a:rPr lang="en-US" sz="2800" dirty="0"/>
+              <a:rPr lang="en-US" sz="2800" dirty="0">
+                <a:latin typeface="Lato" panose="020F0502020204030203" pitchFamily="34" charset="0"/>
+                <a:ea typeface="Lato" panose="020F0502020204030203" pitchFamily="34" charset="0"/>
+                <a:cs typeface="Lato" panose="020F0502020204030203" pitchFamily="34" charset="0"/>
+              </a:rPr>
               <a:t>we consider the encoder and classifiers as distinct entities </a:t>
             </a:r>
           </a:p>
@@ -12058,7 +11829,11 @@
               <a:buFont typeface="Arial" charset="0"/>
               <a:buChar char="•"/>
             </a:pPr>
-            <a:endParaRPr lang="en-US" sz="2800" dirty="0"/>
+            <a:endParaRPr lang="en-US" sz="2800" dirty="0">
+              <a:latin typeface="Lato" panose="020F0502020204030203" pitchFamily="34" charset="0"/>
+              <a:ea typeface="Lato" panose="020F0502020204030203" pitchFamily="34" charset="0"/>
+              <a:cs typeface="Lato" panose="020F0502020204030203" pitchFamily="34" charset="0"/>
+            </a:endParaRPr>
           </a:p>
           <a:p>
             <a:pPr marL="457200" lvl="0" indent="-457200" algn="just">
@@ -12069,7 +11844,11 @@
               <a:buFont typeface="Arial" charset="0"/>
               <a:buChar char="•"/>
             </a:pPr>
-            <a:endParaRPr lang="en-US" sz="2800" dirty="0"/>
+            <a:endParaRPr lang="en-US" sz="2800" dirty="0">
+              <a:latin typeface="Lato" panose="020F0502020204030203" pitchFamily="34" charset="0"/>
+              <a:ea typeface="Lato" panose="020F0502020204030203" pitchFamily="34" charset="0"/>
+              <a:cs typeface="Lato" panose="020F0502020204030203" pitchFamily="34" charset="0"/>
+            </a:endParaRPr>
           </a:p>
           <a:p>
             <a:pPr marL="457200" lvl="0" indent="-457200" algn="just">
@@ -12080,7 +11859,11 @@
               <a:buFont typeface="Arial" charset="0"/>
               <a:buChar char="•"/>
             </a:pPr>
-            <a:endParaRPr lang="en-US" sz="2800" dirty="0"/>
+            <a:endParaRPr lang="en-US" sz="2800" dirty="0">
+              <a:latin typeface="Lato" panose="020F0502020204030203" pitchFamily="34" charset="0"/>
+              <a:ea typeface="Lato" panose="020F0502020204030203" pitchFamily="34" charset="0"/>
+              <a:cs typeface="Lato" panose="020F0502020204030203" pitchFamily="34" charset="0"/>
+            </a:endParaRPr>
           </a:p>
           <a:p>
             <a:pPr marL="457200" lvl="0" indent="-457200" algn="just">
@@ -12091,7 +11874,11 @@
               <a:buFont typeface="Arial" charset="0"/>
               <a:buChar char="•"/>
             </a:pPr>
-            <a:endParaRPr lang="en-US" sz="2800" dirty="0"/>
+            <a:endParaRPr lang="en-US" sz="2800" dirty="0">
+              <a:latin typeface="Lato" panose="020F0502020204030203" pitchFamily="34" charset="0"/>
+              <a:ea typeface="Lato" panose="020F0502020204030203" pitchFamily="34" charset="0"/>
+              <a:cs typeface="Lato" panose="020F0502020204030203" pitchFamily="34" charset="0"/>
+            </a:endParaRPr>
           </a:p>
           <a:p>
             <a:pPr marL="457200" lvl="0" indent="-457200" algn="just">
@@ -12102,7 +11889,11 @@
               <a:buFont typeface="Arial" charset="0"/>
               <a:buChar char="•"/>
             </a:pPr>
-            <a:endParaRPr lang="en-US" sz="2800" b="1" dirty="0"/>
+            <a:endParaRPr lang="en-US" sz="2800" b="1" dirty="0">
+              <a:latin typeface="Lato" panose="020F0502020204030203" pitchFamily="34" charset="0"/>
+              <a:ea typeface="Lato" panose="020F0502020204030203" pitchFamily="34" charset="0"/>
+              <a:cs typeface="Lato" panose="020F0502020204030203" pitchFamily="34" charset="0"/>
+            </a:endParaRPr>
           </a:p>
           <a:p>
             <a:pPr marL="457200" lvl="0" indent="-457200" algn="just">
@@ -12113,7 +11904,11 @@
               <a:buFont typeface="Arial" charset="0"/>
               <a:buChar char="•"/>
             </a:pPr>
-            <a:endParaRPr lang="en-US" sz="2800" b="1" dirty="0"/>
+            <a:endParaRPr lang="en-US" sz="2800" b="1" dirty="0">
+              <a:latin typeface="Lato" panose="020F0502020204030203" pitchFamily="34" charset="0"/>
+              <a:ea typeface="Lato" panose="020F0502020204030203" pitchFamily="34" charset="0"/>
+              <a:cs typeface="Lato" panose="020F0502020204030203" pitchFamily="34" charset="0"/>
+            </a:endParaRPr>
           </a:p>
           <a:p>
             <a:pPr marL="457200" lvl="0" indent="-457200" algn="just">
@@ -12124,7 +11919,11 @@
               <a:buFont typeface="Arial" charset="0"/>
               <a:buChar char="•"/>
             </a:pPr>
-            <a:endParaRPr lang="en-US" sz="2800" b="1" dirty="0"/>
+            <a:endParaRPr lang="en-US" sz="2800" b="1" dirty="0">
+              <a:latin typeface="Lato" panose="020F0502020204030203" pitchFamily="34" charset="0"/>
+              <a:ea typeface="Lato" panose="020F0502020204030203" pitchFamily="34" charset="0"/>
+              <a:cs typeface="Lato" panose="020F0502020204030203" pitchFamily="34" charset="0"/>
+            </a:endParaRPr>
           </a:p>
           <a:p>
             <a:pPr marL="457200" lvl="0" indent="-457200" algn="just">
@@ -12135,7 +11934,11 @@
               <a:buFont typeface="Arial" charset="0"/>
               <a:buChar char="•"/>
             </a:pPr>
-            <a:endParaRPr lang="en-US" sz="2800" b="1" dirty="0"/>
+            <a:endParaRPr lang="en-US" sz="2800" b="1" dirty="0">
+              <a:latin typeface="Lato" panose="020F0502020204030203" pitchFamily="34" charset="0"/>
+              <a:ea typeface="Lato" panose="020F0502020204030203" pitchFamily="34" charset="0"/>
+              <a:cs typeface="Lato" panose="020F0502020204030203" pitchFamily="34" charset="0"/>
+            </a:endParaRPr>
           </a:p>
           <a:p>
             <a:pPr marL="457200" lvl="0" indent="-457200" algn="just">
@@ -12146,7 +11949,11 @@
               <a:buFont typeface="Arial" charset="0"/>
               <a:buChar char="•"/>
             </a:pPr>
-            <a:endParaRPr lang="en-US" sz="2800" b="1" dirty="0"/>
+            <a:endParaRPr lang="en-US" sz="2800" b="1" dirty="0">
+              <a:latin typeface="Lato" panose="020F0502020204030203" pitchFamily="34" charset="0"/>
+              <a:ea typeface="Lato" panose="020F0502020204030203" pitchFamily="34" charset="0"/>
+              <a:cs typeface="Lato" panose="020F0502020204030203" pitchFamily="34" charset="0"/>
+            </a:endParaRPr>
           </a:p>
           <a:p>
             <a:pPr marL="457200" lvl="0" indent="-457200" algn="just">
@@ -12157,7 +11964,11 @@
               <a:buFont typeface="Arial" charset="0"/>
               <a:buChar char="•"/>
             </a:pPr>
-            <a:endParaRPr lang="en-US" sz="2800" b="1" dirty="0"/>
+            <a:endParaRPr lang="en-US" sz="2800" b="1" dirty="0">
+              <a:latin typeface="Lato" panose="020F0502020204030203" pitchFamily="34" charset="0"/>
+              <a:ea typeface="Lato" panose="020F0502020204030203" pitchFamily="34" charset="0"/>
+              <a:cs typeface="Lato" panose="020F0502020204030203" pitchFamily="34" charset="0"/>
+            </a:endParaRPr>
           </a:p>
           <a:p>
             <a:pPr marL="457200" lvl="0" indent="-457200" algn="just">
@@ -12169,32 +11980,20 @@
               <a:buChar char="•"/>
             </a:pPr>
             <a:r>
-              <a:rPr lang="en-US" sz="2800" b="1" dirty="0" smtClean="0"/>
-              <a:t>Deep NN</a:t>
+              <a:rPr lang="en-US" sz="2800" b="1" dirty="0">
+                <a:latin typeface="Lato" panose="020F0502020204030203" pitchFamily="34" charset="0"/>
+                <a:ea typeface="Lato" panose="020F0502020204030203" pitchFamily="34" charset="0"/>
+                <a:cs typeface="Lato" panose="020F0502020204030203" pitchFamily="34" charset="0"/>
+              </a:rPr>
+              <a:t>Deep NN Classifiers:</a:t>
             </a:r>
             <a:r>
-              <a:rPr lang="en-US" sz="2800" b="1" dirty="0" smtClean="0"/>
-              <a:t> </a:t>
-            </a:r>
-            <a:r>
-              <a:rPr lang="en-US" sz="2800" b="1" dirty="0"/>
-              <a:t>Classifiers: </a:t>
-            </a:r>
-            <a:r>
-              <a:rPr lang="en-US" sz="2800" dirty="0"/>
-              <a:t>a </a:t>
-            </a:r>
-            <a:r>
-              <a:rPr lang="en-US" sz="2800" dirty="0" smtClean="0"/>
-              <a:t>six</a:t>
-            </a:r>
-            <a:r>
-              <a:rPr lang="en-US" sz="2800" dirty="0" smtClean="0"/>
-              <a:t> convolution layers with 3 FNN (gender </a:t>
-            </a:r>
-            <a:r>
-              <a:rPr lang="en-US" sz="2800" dirty="0"/>
-              <a:t>and smile models)</a:t>
+              <a:rPr lang="en-US" sz="2800" dirty="0">
+                <a:latin typeface="Lato" panose="020F0502020204030203" pitchFamily="34" charset="0"/>
+                <a:ea typeface="Lato" panose="020F0502020204030203" pitchFamily="34" charset="0"/>
+                <a:cs typeface="Lato" panose="020F0502020204030203" pitchFamily="34" charset="0"/>
+              </a:rPr>
+              <a:t> six convolution layers with 3 FNN (gender and smile models)</a:t>
             </a:r>
           </a:p>
           <a:p>
@@ -12207,27 +12006,35 @@
               <a:buChar char="•"/>
             </a:pPr>
             <a:r>
-              <a:rPr lang="en-US" sz="2800" b="1" dirty="0"/>
-              <a:t>Compressive Encoders</a:t>
+              <a:rPr lang="en-US" sz="2800" b="1" dirty="0">
+                <a:latin typeface="Lato" panose="020F0502020204030203" pitchFamily="34" charset="0"/>
+                <a:ea typeface="Lato" panose="020F0502020204030203" pitchFamily="34" charset="0"/>
+                <a:cs typeface="Lato" panose="020F0502020204030203" pitchFamily="34" charset="0"/>
+              </a:rPr>
+              <a:t>Compressive Encoder</a:t>
             </a:r>
             <a:r>
-              <a:rPr lang="en-US" sz="2800" dirty="0"/>
-              <a:t>: </a:t>
+              <a:rPr lang="en-US" sz="2800" dirty="0">
+                <a:latin typeface="Lato" panose="020F0502020204030203" pitchFamily="34" charset="0"/>
+                <a:ea typeface="Lato" panose="020F0502020204030203" pitchFamily="34" charset="0"/>
+                <a:cs typeface="Lato" panose="020F0502020204030203" pitchFamily="34" charset="0"/>
+              </a:rPr>
+              <a:t>: PCA was used as a lossy compression. Images reconstructed via the first </a:t>
             </a:r>
             <a:r>
-              <a:rPr lang="en-US" sz="2800" b="1" dirty="0"/>
-              <a:t>PCA</a:t>
-            </a:r>
-            <a:r>
-              <a:rPr lang="en-US" sz="2800" dirty="0"/>
-              <a:t>,  reconstruct image tensor via the first </a:t>
-            </a:r>
-            <a:r>
-              <a:rPr lang="en-US" sz="2800" b="1" dirty="0"/>
+              <a:rPr lang="en-US" sz="2800" b="1" dirty="0">
+                <a:latin typeface="Lato" panose="020F0502020204030203" pitchFamily="34" charset="0"/>
+                <a:ea typeface="Lato" panose="020F0502020204030203" pitchFamily="34" charset="0"/>
+                <a:cs typeface="Lato" panose="020F0502020204030203" pitchFamily="34" charset="0"/>
+              </a:rPr>
               <a:t>d</a:t>
             </a:r>
             <a:r>
-              <a:rPr lang="en-US" sz="2800" dirty="0"/>
+              <a:rPr lang="en-US" sz="2800" dirty="0">
+                <a:latin typeface="Lato" panose="020F0502020204030203" pitchFamily="34" charset="0"/>
+                <a:ea typeface="Lato" panose="020F0502020204030203" pitchFamily="34" charset="0"/>
+                <a:cs typeface="Lato" panose="020F0502020204030203" pitchFamily="34" charset="0"/>
+              </a:rPr>
               <a:t> principle eigenvectors for each color channel. </a:t>
             </a:r>
           </a:p>
@@ -12241,32 +12048,21 @@
               <a:buChar char="•"/>
             </a:pPr>
             <a:r>
-              <a:rPr lang="en-US" sz="2800" b="1" dirty="0"/>
-              <a:t>Shallow Autoencoders: </a:t>
+              <a:rPr lang="en-US" sz="2800" b="1" dirty="0">
+                <a:latin typeface="Lato" panose="020F0502020204030203" pitchFamily="34" charset="0"/>
+                <a:ea typeface="Lato" panose="020F0502020204030203" pitchFamily="34" charset="0"/>
+                <a:cs typeface="Lato" panose="020F0502020204030203" pitchFamily="34" charset="0"/>
+              </a:rPr>
+              <a:t>Shallow Autoencoder: </a:t>
             </a:r>
             <a:r>
-              <a:rPr lang="en-US" sz="2800" dirty="0"/>
-              <a:t>universal </a:t>
+              <a:rPr lang="en-US" sz="2800" dirty="0">
+                <a:latin typeface="Lato" panose="020F0502020204030203" pitchFamily="34" charset="0"/>
+                <a:ea typeface="Lato" panose="020F0502020204030203" pitchFamily="34" charset="0"/>
+                <a:cs typeface="Lato" panose="020F0502020204030203" pitchFamily="34" charset="0"/>
+              </a:rPr>
+              <a:t>Based off of [4] even complex models can be fooled via simple strategies. Our shallow autoencoder has a loss defined to maximize the loss in gender while minimizing the loss in smile, as opposed to the explicit alternating optimization scheme in [2].</a:t>
             </a:r>
-            <a:r>
-              <a:rPr lang="en-US" sz="2800" b="1" dirty="0"/>
-              <a:t>approximation theorem</a:t>
-            </a:r>
-            <a:r>
-              <a:rPr lang="en-US" sz="2800" dirty="0"/>
-              <a:t>, neural networks can reproduce any function under the appropriate constraints. We are able to back propagate through the architecture of multiple neural networks to appropriately optimize their respective loss functions. </a:t>
-            </a:r>
-          </a:p>
-          <a:p>
-            <a:pPr marL="457200" lvl="0" indent="-457200" algn="just">
-              <a:buClr>
-                <a:schemeClr val="dk1"/>
-              </a:buClr>
-              <a:buSzPct val="100000"/>
-              <a:buFont typeface="Arial" charset="0"/>
-              <a:buChar char="•"/>
-            </a:pPr>
-            <a:endParaRPr lang="en-US" sz="2800" b="1" dirty="0"/>
           </a:p>
           <a:p>
             <a:pPr marL="457200" lvl="0" indent="-457200" algn="just">
@@ -12284,9 +12080,9 @@
               <a:solidFill>
                 <a:schemeClr val="dk1"/>
               </a:solidFill>
-              <a:latin typeface="Calibri"/>
-              <a:ea typeface="Calibri"/>
-              <a:cs typeface="Calibri"/>
+              <a:latin typeface="Lato" panose="020F0502020204030203" pitchFamily="34" charset="0"/>
+              <a:ea typeface="Lato" panose="020F0502020204030203" pitchFamily="34" charset="0"/>
+              <a:cs typeface="Lato" panose="020F0502020204030203" pitchFamily="34" charset="0"/>
               <a:sym typeface="Calibri"/>
             </a:endParaRPr>
           </a:p>
@@ -12355,7 +12151,7 @@
           <p:cNvPr id="2" name="Rectangle 1">
             <a:extLst>
               <a:ext uri="{FF2B5EF4-FFF2-40B4-BE49-F238E27FC236}">
-                <a16:creationId xmlns:a16="http://schemas.microsoft.com/office/drawing/2014/main" xmlns="" id="{A73FBCD3-4812-46F5-B0FF-6677DC709A9A}"/>
+                <a16:creationId xmlns:a16="http://schemas.microsoft.com/office/drawing/2014/main" id="{A73FBCD3-4812-46F5-B0FF-6677DC709A9A}"/>
               </a:ext>
             </a:extLst>
           </p:cNvPr>
@@ -12379,14 +12175,26 @@
           <a:p>
             <a:pPr algn="just"/>
             <a:r>
-              <a:rPr lang="en-US" sz="2800" b="1" dirty="0"/>
+              <a:rPr lang="en-US" sz="2800" b="1" dirty="0">
+                <a:latin typeface="Lato" panose="020F0502020204030203" pitchFamily="34" charset="0"/>
+                <a:ea typeface="Lato" panose="020F0502020204030203" pitchFamily="34" charset="0"/>
+                <a:cs typeface="Lato" panose="020F0502020204030203" pitchFamily="34" charset="0"/>
+              </a:rPr>
               <a:t>Machine learning </a:t>
             </a:r>
             <a:r>
-              <a:rPr lang="en-US" sz="2800" dirty="0"/>
+              <a:rPr lang="en-US" sz="2800" dirty="0">
+                <a:latin typeface="Lato" panose="020F0502020204030203" pitchFamily="34" charset="0"/>
+                <a:ea typeface="Lato" panose="020F0502020204030203" pitchFamily="34" charset="0"/>
+                <a:cs typeface="Lato" panose="020F0502020204030203" pitchFamily="34" charset="0"/>
+              </a:rPr>
               <a:t>(ML) methods serve many purposes today. The most revered applications of ML are normally coupled with benevolent intentions such as adverting cyber attacks, classifying materials in images for security and health purposes, etc. But ML methods do not necessarily have to be applied for favorable causes. Inference attacks, for instance, are adversary learning methods that can infer private information about public information or data. For this reason it is essential to protect privacy by deterring adversarial machine learning.</a:t>
             </a:r>
-            <a:endParaRPr lang="en-US" sz="2700" dirty="0"/>
+            <a:endParaRPr lang="en-US" sz="2700" dirty="0">
+              <a:latin typeface="Lato" panose="020F0502020204030203" pitchFamily="34" charset="0"/>
+              <a:ea typeface="Lato" panose="020F0502020204030203" pitchFamily="34" charset="0"/>
+              <a:cs typeface="Lato" panose="020F0502020204030203" pitchFamily="34" charset="0"/>
+            </a:endParaRPr>
           </a:p>
         </p:txBody>
       </p:sp>
@@ -12395,7 +12203,7 @@
           <p:cNvPr id="3" name="Rectangle 2">
             <a:extLst>
               <a:ext uri="{FF2B5EF4-FFF2-40B4-BE49-F238E27FC236}">
-                <a16:creationId xmlns:a16="http://schemas.microsoft.com/office/drawing/2014/main" xmlns="" id="{5B6EA0D6-945E-4A95-8550-AB492CF7FE5A}"/>
+                <a16:creationId xmlns:a16="http://schemas.microsoft.com/office/drawing/2014/main" id="{5B6EA0D6-945E-4A95-8550-AB492CF7FE5A}"/>
               </a:ext>
             </a:extLst>
           </p:cNvPr>
@@ -12404,7 +12212,7 @@
         </p:nvSpPr>
         <p:spPr>
           <a:xfrm>
-            <a:off x="1156408" y="11973530"/>
+            <a:off x="1156408" y="11893320"/>
             <a:ext cx="7119193" cy="3970318"/>
           </a:xfrm>
           <a:prstGeom prst="rect">
@@ -12422,12 +12230,20 @@
               <a:buChar char="•"/>
             </a:pPr>
             <a:r>
-              <a:rPr lang="en-US" sz="2800" b="1" dirty="0"/>
+              <a:rPr lang="en-US" sz="2800" b="1" dirty="0">
+                <a:latin typeface="Lato" panose="020F0502020204030203" pitchFamily="34" charset="0"/>
+                <a:ea typeface="Lato" panose="020F0502020204030203" pitchFamily="34" charset="0"/>
+                <a:cs typeface="Lato" panose="020F0502020204030203" pitchFamily="34" charset="0"/>
+              </a:rPr>
               <a:t>Generative Adversarial Privacy </a:t>
             </a:r>
             <a:r>
-              <a:rPr lang="en-US" sz="2800" dirty="0"/>
-              <a:t>(GAP): to protect the privacy of public data by distorting data. </a:t>
+              <a:rPr lang="en-US" sz="2800" dirty="0">
+                <a:latin typeface="Lato" panose="020F0502020204030203" pitchFamily="34" charset="0"/>
+                <a:ea typeface="Lato" panose="020F0502020204030203" pitchFamily="34" charset="0"/>
+                <a:cs typeface="Lato" panose="020F0502020204030203" pitchFamily="34" charset="0"/>
+              </a:rPr>
+              <a:t>(GAP): to protect the privacy of public data via distortion. </a:t>
             </a:r>
           </a:p>
           <a:p>
@@ -12436,14 +12252,26 @@
               <a:buChar char="•"/>
             </a:pPr>
             <a:r>
-              <a:rPr lang="en-US" sz="2800" b="1" dirty="0"/>
-              <a:t>Goa</a:t>
+              <a:rPr lang="en-US" sz="2800" b="1" dirty="0">
+                <a:latin typeface="Lato" panose="020F0502020204030203" pitchFamily="34" charset="0"/>
+                <a:ea typeface="Lato" panose="020F0502020204030203" pitchFamily="34" charset="0"/>
+                <a:cs typeface="Lato" panose="020F0502020204030203" pitchFamily="34" charset="0"/>
+              </a:rPr>
+              <a:t>Goal</a:t>
             </a:r>
             <a:r>
-              <a:rPr lang="en-US" sz="2800" dirty="0"/>
-              <a:t>l: to enable the protection of sensitive information by obscuring generative adversarial networks (GANs) inferences of sensitive data and while not affecting the inference of non-sensitive attributes.</a:t>
+              <a:rPr lang="en-US" sz="2800" dirty="0">
+                <a:latin typeface="Lato" panose="020F0502020204030203" pitchFamily="34" charset="0"/>
+                <a:ea typeface="Lato" panose="020F0502020204030203" pitchFamily="34" charset="0"/>
+                <a:cs typeface="Lato" panose="020F0502020204030203" pitchFamily="34" charset="0"/>
+              </a:rPr>
+              <a:t>: to enable the protection of sensitive information via an autoencoder inside a generative adversarial network (GAN) in order  to hinder inferences on sensitive data while not preventing the inference on non-sensitive attributes.</a:t>
             </a:r>
-            <a:endParaRPr lang="en-US" sz="2700" dirty="0"/>
+            <a:endParaRPr lang="en-US" sz="2700" dirty="0">
+              <a:latin typeface="Lato" panose="020F0502020204030203" pitchFamily="34" charset="0"/>
+              <a:ea typeface="Lato" panose="020F0502020204030203" pitchFamily="34" charset="0"/>
+              <a:cs typeface="Lato" panose="020F0502020204030203" pitchFamily="34" charset="0"/>
+            </a:endParaRPr>
           </a:p>
         </p:txBody>
       </p:sp>
@@ -12452,7 +12280,7 @@
           <p:cNvPr id="4" name="Rectangle 3">
             <a:extLst>
               <a:ext uri="{FF2B5EF4-FFF2-40B4-BE49-F238E27FC236}">
-                <a16:creationId xmlns:a16="http://schemas.microsoft.com/office/drawing/2014/main" xmlns="" id="{6D25CF8F-816B-4C5A-9D2A-71487A8751EC}"/>
+                <a16:creationId xmlns:a16="http://schemas.microsoft.com/office/drawing/2014/main" id="{6D25CF8F-816B-4C5A-9D2A-71487A8751EC}"/>
               </a:ext>
             </a:extLst>
           </p:cNvPr>
@@ -12480,36 +12308,41 @@
             </a:pPr>
             <a:r>
               <a:rPr lang="en-US" sz="2400" dirty="0">
-                <a:latin typeface="Arial" panose="020B0604020202020204" pitchFamily="34" charset="0"/>
-                <a:cs typeface="Arial" panose="020B0604020202020204" pitchFamily="34" charset="0"/>
+                <a:latin typeface="Lato" panose="020F0502020204030203" pitchFamily="34" charset="0"/>
+                <a:ea typeface="Lato" panose="020F0502020204030203" pitchFamily="34" charset="0"/>
+                <a:cs typeface="Lato" panose="020F0502020204030203" pitchFamily="34" charset="0"/>
               </a:rPr>
               <a:t>Ari </a:t>
             </a:r>
             <a:r>
               <a:rPr lang="en-US" sz="2400" dirty="0" err="1">
-                <a:latin typeface="Arial" panose="020B0604020202020204" pitchFamily="34" charset="0"/>
-                <a:cs typeface="Arial" panose="020B0604020202020204" pitchFamily="34" charset="0"/>
+                <a:latin typeface="Lato" panose="020F0502020204030203" pitchFamily="34" charset="0"/>
+                <a:ea typeface="Lato" panose="020F0502020204030203" pitchFamily="34" charset="0"/>
+                <a:cs typeface="Lato" panose="020F0502020204030203" pitchFamily="34" charset="0"/>
               </a:rPr>
               <a:t>Ekmekji</a:t>
             </a:r>
             <a:r>
               <a:rPr lang="en-US" sz="2400" dirty="0">
-                <a:latin typeface="Arial" panose="020B0604020202020204" pitchFamily="34" charset="0"/>
-                <a:cs typeface="Arial" panose="020B0604020202020204" pitchFamily="34" charset="0"/>
+                <a:latin typeface="Lato" panose="020F0502020204030203" pitchFamily="34" charset="0"/>
+                <a:ea typeface="Lato" panose="020F0502020204030203" pitchFamily="34" charset="0"/>
+                <a:cs typeface="Lato" panose="020F0502020204030203" pitchFamily="34" charset="0"/>
               </a:rPr>
               <a:t>. </a:t>
             </a:r>
             <a:r>
               <a:rPr lang="en-US" sz="2400" i="1" dirty="0">
-                <a:latin typeface="Arial" panose="020B0604020202020204" pitchFamily="34" charset="0"/>
-                <a:cs typeface="Arial" panose="020B0604020202020204" pitchFamily="34" charset="0"/>
+                <a:latin typeface="Lato" panose="020F0502020204030203" pitchFamily="34" charset="0"/>
+                <a:ea typeface="Lato" panose="020F0502020204030203" pitchFamily="34" charset="0"/>
+                <a:cs typeface="Lato" panose="020F0502020204030203" pitchFamily="34" charset="0"/>
               </a:rPr>
               <a:t>Convolutional Neural Networks for Age and Gender Classification</a:t>
             </a:r>
             <a:r>
               <a:rPr lang="en-US" sz="2400" dirty="0">
-                <a:latin typeface="Arial" panose="020B0604020202020204" pitchFamily="34" charset="0"/>
-                <a:cs typeface="Arial" panose="020B0604020202020204" pitchFamily="34" charset="0"/>
+                <a:latin typeface="Lato" panose="020F0502020204030203" pitchFamily="34" charset="0"/>
+                <a:ea typeface="Lato" panose="020F0502020204030203" pitchFamily="34" charset="0"/>
+                <a:cs typeface="Lato" panose="020F0502020204030203" pitchFamily="34" charset="0"/>
               </a:rPr>
               <a:t>.</a:t>
             </a:r>
@@ -12521,29 +12354,33 @@
             </a:pPr>
             <a:r>
               <a:rPr lang="en-US" sz="2400" dirty="0" err="1">
-                <a:latin typeface="Arial" panose="020B0604020202020204" pitchFamily="34" charset="0"/>
-                <a:cs typeface="Arial" panose="020B0604020202020204" pitchFamily="34" charset="0"/>
+                <a:latin typeface="Lato" panose="020F0502020204030203" pitchFamily="34" charset="0"/>
+                <a:ea typeface="Lato" panose="020F0502020204030203" pitchFamily="34" charset="0"/>
+                <a:cs typeface="Lato" panose="020F0502020204030203" pitchFamily="34" charset="0"/>
               </a:rPr>
               <a:t>Jihun</a:t>
             </a:r>
             <a:r>
               <a:rPr lang="en-US" sz="2400" dirty="0">
-                <a:latin typeface="Arial" panose="020B0604020202020204" pitchFamily="34" charset="0"/>
-                <a:cs typeface="Arial" panose="020B0604020202020204" pitchFamily="34" charset="0"/>
+                <a:latin typeface="Lato" panose="020F0502020204030203" pitchFamily="34" charset="0"/>
+                <a:ea typeface="Lato" panose="020F0502020204030203" pitchFamily="34" charset="0"/>
+                <a:cs typeface="Lato" panose="020F0502020204030203" pitchFamily="34" charset="0"/>
               </a:rPr>
               <a:t> Hamm</a:t>
             </a:r>
             <a:r>
               <a:rPr lang="en-US" sz="2400" i="1" dirty="0">
-                <a:latin typeface="Arial" panose="020B0604020202020204" pitchFamily="34" charset="0"/>
-                <a:cs typeface="Arial" panose="020B0604020202020204" pitchFamily="34" charset="0"/>
+                <a:latin typeface="Lato" panose="020F0502020204030203" pitchFamily="34" charset="0"/>
+                <a:ea typeface="Lato" panose="020F0502020204030203" pitchFamily="34" charset="0"/>
+                <a:cs typeface="Lato" panose="020F0502020204030203" pitchFamily="34" charset="0"/>
               </a:rPr>
               <a:t>. Minimax Filter: Learning to Preserve Privacy from Inference Attacks</a:t>
             </a:r>
             <a:r>
               <a:rPr lang="en-US" sz="2400" dirty="0">
-                <a:latin typeface="Arial" panose="020B0604020202020204" pitchFamily="34" charset="0"/>
-                <a:cs typeface="Arial" panose="020B0604020202020204" pitchFamily="34" charset="0"/>
+                <a:latin typeface="Lato" panose="020F0502020204030203" pitchFamily="34" charset="0"/>
+                <a:ea typeface="Lato" panose="020F0502020204030203" pitchFamily="34" charset="0"/>
+                <a:cs typeface="Lato" panose="020F0502020204030203" pitchFamily="34" charset="0"/>
               </a:rPr>
               <a:t>.</a:t>
             </a:r>
@@ -12555,36 +12392,41 @@
             </a:pPr>
             <a:r>
               <a:rPr lang="en-US" sz="2400" dirty="0">
-                <a:latin typeface="Arial" panose="020B0604020202020204" pitchFamily="34" charset="0"/>
-                <a:cs typeface="Arial" panose="020B0604020202020204" pitchFamily="34" charset="0"/>
+                <a:latin typeface="Lato" panose="020F0502020204030203" pitchFamily="34" charset="0"/>
+                <a:ea typeface="Lato" panose="020F0502020204030203" pitchFamily="34" charset="0"/>
+                <a:cs typeface="Lato" panose="020F0502020204030203" pitchFamily="34" charset="0"/>
               </a:rPr>
               <a:t>G. </a:t>
             </a:r>
             <a:r>
               <a:rPr lang="en-US" sz="2400" dirty="0" err="1">
-                <a:latin typeface="Arial" panose="020B0604020202020204" pitchFamily="34" charset="0"/>
-                <a:cs typeface="Arial" panose="020B0604020202020204" pitchFamily="34" charset="0"/>
+                <a:latin typeface="Lato" panose="020F0502020204030203" pitchFamily="34" charset="0"/>
+                <a:ea typeface="Lato" panose="020F0502020204030203" pitchFamily="34" charset="0"/>
+                <a:cs typeface="Lato" panose="020F0502020204030203" pitchFamily="34" charset="0"/>
               </a:rPr>
               <a:t>Cybenko</a:t>
             </a:r>
             <a:r>
               <a:rPr lang="en-US" sz="2400" dirty="0">
-                <a:latin typeface="Arial" panose="020B0604020202020204" pitchFamily="34" charset="0"/>
-                <a:cs typeface="Arial" panose="020B0604020202020204" pitchFamily="34" charset="0"/>
+                <a:latin typeface="Lato" panose="020F0502020204030203" pitchFamily="34" charset="0"/>
+                <a:ea typeface="Lato" panose="020F0502020204030203" pitchFamily="34" charset="0"/>
+                <a:cs typeface="Lato" panose="020F0502020204030203" pitchFamily="34" charset="0"/>
               </a:rPr>
               <a:t>. </a:t>
             </a:r>
             <a:r>
               <a:rPr lang="en-US" sz="2400" i="1" dirty="0">
-                <a:latin typeface="Arial" panose="020B0604020202020204" pitchFamily="34" charset="0"/>
-                <a:cs typeface="Arial" panose="020B0604020202020204" pitchFamily="34" charset="0"/>
+                <a:latin typeface="Lato" panose="020F0502020204030203" pitchFamily="34" charset="0"/>
+                <a:ea typeface="Lato" panose="020F0502020204030203" pitchFamily="34" charset="0"/>
+                <a:cs typeface="Lato" panose="020F0502020204030203" pitchFamily="34" charset="0"/>
               </a:rPr>
               <a:t>Approximation by superpositions of a sigmoidal function</a:t>
             </a:r>
             <a:r>
               <a:rPr lang="en-US" sz="2400" dirty="0">
-                <a:latin typeface="Arial" panose="020B0604020202020204" pitchFamily="34" charset="0"/>
-                <a:cs typeface="Arial" panose="020B0604020202020204" pitchFamily="34" charset="0"/>
+                <a:latin typeface="Lato" panose="020F0502020204030203" pitchFamily="34" charset="0"/>
+                <a:ea typeface="Lato" panose="020F0502020204030203" pitchFamily="34" charset="0"/>
+                <a:cs typeface="Lato" panose="020F0502020204030203" pitchFamily="34" charset="0"/>
               </a:rPr>
               <a:t>.</a:t>
             </a:r>
@@ -12596,71 +12438,81 @@
             </a:pPr>
             <a:r>
               <a:rPr lang="es-ES" sz="2200" dirty="0" err="1">
-                <a:latin typeface="Arial" panose="020B0604020202020204" pitchFamily="34" charset="0"/>
-                <a:cs typeface="Arial" panose="020B0604020202020204" pitchFamily="34" charset="0"/>
+                <a:latin typeface="Lato" panose="020F0502020204030203" pitchFamily="34" charset="0"/>
+                <a:ea typeface="Lato" panose="020F0502020204030203" pitchFamily="34" charset="0"/>
+                <a:cs typeface="Lato" panose="020F0502020204030203" pitchFamily="34" charset="0"/>
               </a:rPr>
               <a:t>Jiawei</a:t>
             </a:r>
             <a:r>
               <a:rPr lang="es-ES" sz="2200" dirty="0">
-                <a:latin typeface="Arial" panose="020B0604020202020204" pitchFamily="34" charset="0"/>
-                <a:cs typeface="Arial" panose="020B0604020202020204" pitchFamily="34" charset="0"/>
+                <a:latin typeface="Lato" panose="020F0502020204030203" pitchFamily="34" charset="0"/>
+                <a:ea typeface="Lato" panose="020F0502020204030203" pitchFamily="34" charset="0"/>
+                <a:cs typeface="Lato" panose="020F0502020204030203" pitchFamily="34" charset="0"/>
               </a:rPr>
               <a:t> Su, Danilo </a:t>
             </a:r>
             <a:r>
               <a:rPr lang="es-ES" sz="2200" dirty="0" err="1">
-                <a:latin typeface="Arial" panose="020B0604020202020204" pitchFamily="34" charset="0"/>
-                <a:cs typeface="Arial" panose="020B0604020202020204" pitchFamily="34" charset="0"/>
+                <a:latin typeface="Lato" panose="020F0502020204030203" pitchFamily="34" charset="0"/>
+                <a:ea typeface="Lato" panose="020F0502020204030203" pitchFamily="34" charset="0"/>
+                <a:cs typeface="Lato" panose="020F0502020204030203" pitchFamily="34" charset="0"/>
               </a:rPr>
               <a:t>Vasconcellos</a:t>
             </a:r>
             <a:r>
               <a:rPr lang="es-ES" sz="2200" dirty="0">
-                <a:latin typeface="Arial" panose="020B0604020202020204" pitchFamily="34" charset="0"/>
-                <a:cs typeface="Arial" panose="020B0604020202020204" pitchFamily="34" charset="0"/>
+                <a:latin typeface="Lato" panose="020F0502020204030203" pitchFamily="34" charset="0"/>
+                <a:ea typeface="Lato" panose="020F0502020204030203" pitchFamily="34" charset="0"/>
+                <a:cs typeface="Lato" panose="020F0502020204030203" pitchFamily="34" charset="0"/>
               </a:rPr>
               <a:t> Vargas, </a:t>
             </a:r>
             <a:r>
               <a:rPr lang="es-ES" sz="2200" dirty="0" err="1">
-                <a:latin typeface="Arial" panose="020B0604020202020204" pitchFamily="34" charset="0"/>
-                <a:cs typeface="Arial" panose="020B0604020202020204" pitchFamily="34" charset="0"/>
+                <a:latin typeface="Lato" panose="020F0502020204030203" pitchFamily="34" charset="0"/>
+                <a:ea typeface="Lato" panose="020F0502020204030203" pitchFamily="34" charset="0"/>
+                <a:cs typeface="Lato" panose="020F0502020204030203" pitchFamily="34" charset="0"/>
               </a:rPr>
               <a:t>Sakurai</a:t>
             </a:r>
             <a:r>
               <a:rPr lang="es-ES" sz="2200" dirty="0">
-                <a:latin typeface="Arial" panose="020B0604020202020204" pitchFamily="34" charset="0"/>
-                <a:cs typeface="Arial" panose="020B0604020202020204" pitchFamily="34" charset="0"/>
+                <a:latin typeface="Lato" panose="020F0502020204030203" pitchFamily="34" charset="0"/>
+                <a:ea typeface="Lato" panose="020F0502020204030203" pitchFamily="34" charset="0"/>
+                <a:cs typeface="Lato" panose="020F0502020204030203" pitchFamily="34" charset="0"/>
               </a:rPr>
               <a:t> </a:t>
             </a:r>
             <a:r>
               <a:rPr lang="es-ES" sz="2200" dirty="0" err="1">
-                <a:latin typeface="Arial" panose="020B0604020202020204" pitchFamily="34" charset="0"/>
-                <a:cs typeface="Arial" panose="020B0604020202020204" pitchFamily="34" charset="0"/>
+                <a:latin typeface="Lato" panose="020F0502020204030203" pitchFamily="34" charset="0"/>
+                <a:ea typeface="Lato" panose="020F0502020204030203" pitchFamily="34" charset="0"/>
+                <a:cs typeface="Lato" panose="020F0502020204030203" pitchFamily="34" charset="0"/>
               </a:rPr>
               <a:t>Kouichi</a:t>
             </a:r>
             <a:r>
               <a:rPr lang="es-ES" sz="2200" dirty="0">
-                <a:latin typeface="Arial" panose="020B0604020202020204" pitchFamily="34" charset="0"/>
-                <a:cs typeface="Arial" panose="020B0604020202020204" pitchFamily="34" charset="0"/>
+                <a:latin typeface="Lato" panose="020F0502020204030203" pitchFamily="34" charset="0"/>
+                <a:ea typeface="Lato" panose="020F0502020204030203" pitchFamily="34" charset="0"/>
+                <a:cs typeface="Lato" panose="020F0502020204030203" pitchFamily="34" charset="0"/>
               </a:rPr>
               <a:t>. </a:t>
             </a:r>
             <a:r>
               <a:rPr lang="en-US" sz="2200" i="1" dirty="0">
-                <a:latin typeface="Arial" panose="020B0604020202020204" pitchFamily="34" charset="0"/>
-                <a:cs typeface="Arial" panose="020B0604020202020204" pitchFamily="34" charset="0"/>
+                <a:latin typeface="Lato" panose="020F0502020204030203" pitchFamily="34" charset="0"/>
+                <a:ea typeface="Lato" panose="020F0502020204030203" pitchFamily="34" charset="0"/>
+                <a:cs typeface="Lato" panose="020F0502020204030203" pitchFamily="34" charset="0"/>
               </a:rPr>
               <a:t>One pixel attack for fooling deep neural networks</a:t>
             </a:r>
             <a:r>
               <a:rPr lang="en-US" sz="2200" dirty="0">
-                <a:latin typeface="Arial" panose="020B0604020202020204" pitchFamily="34" charset="0"/>
-                <a:cs typeface="Arial" panose="020B0604020202020204" pitchFamily="34" charset="0"/>
+                <a:latin typeface="Lato" panose="020F0502020204030203" pitchFamily="34" charset="0"/>
+                <a:ea typeface="Lato" panose="020F0502020204030203" pitchFamily="34" charset="0"/>
+                <a:cs typeface="Lato" panose="020F0502020204030203" pitchFamily="34" charset="0"/>
               </a:rPr>
               <a:t>.</a:t>
             </a:r>
@@ -12672,7 +12524,7 @@
           <p:cNvPr id="18" name="TextBox 17">
             <a:extLst>
               <a:ext uri="{FF2B5EF4-FFF2-40B4-BE49-F238E27FC236}">
-                <a16:creationId xmlns:a16="http://schemas.microsoft.com/office/drawing/2014/main" xmlns="" id="{600D6531-4208-4B29-AC92-0210C85045CC}"/>
+                <a16:creationId xmlns:a16="http://schemas.microsoft.com/office/drawing/2014/main" id="{600D6531-4208-4B29-AC92-0210C85045CC}"/>
               </a:ext>
             </a:extLst>
           </p:cNvPr>
@@ -12681,7 +12533,7 @@
         </p:nvSpPr>
         <p:spPr>
           <a:xfrm>
-            <a:off x="16665859" y="6942296"/>
+            <a:off x="16665859" y="6835971"/>
             <a:ext cx="14918868" cy="3000821"/>
           </a:xfrm>
           <a:prstGeom prst="rect">
@@ -12697,71 +12549,23 @@
           <a:p>
             <a:pPr algn="just"/>
             <a:r>
-              <a:rPr lang="en-US" sz="2700" dirty="0"/>
-              <a:t>The All Model entails </a:t>
-            </a:r>
-            <a:r>
-              <a:rPr lang="en-US" sz="2700" dirty="0" err="1" smtClean="0"/>
-              <a:t>VGGNet</a:t>
-            </a:r>
-            <a:r>
-              <a:rPr lang="en-US" sz="2700" dirty="0" smtClean="0"/>
-              <a:t> </a:t>
-            </a:r>
-            <a:r>
-              <a:rPr lang="en-US" sz="2700" dirty="0"/>
-              <a:t>with 3 sets of 2 convolutional layers with a </a:t>
-            </a:r>
-            <a:r>
-              <a:rPr lang="en-US" sz="2700" dirty="0" err="1"/>
-              <a:t>maxpool</a:t>
-            </a:r>
-            <a:r>
-              <a:rPr lang="en-US" sz="2700" dirty="0"/>
-              <a:t> layer. The No Training All Model results were computed by a 2 hidden layer network autoencoder. This yielded favorable results to predict the Smile Model while lowering the accuracy of the Gender Model.</a:t>
+              <a:rPr lang="en-US" sz="2700" dirty="0">
+                <a:latin typeface="Lato" panose="020F0502020204030203" pitchFamily="34" charset="0"/>
+                <a:ea typeface="Lato" panose="020F0502020204030203" pitchFamily="34" charset="0"/>
+                <a:cs typeface="Lato" panose="020F0502020204030203" pitchFamily="34" charset="0"/>
+              </a:rPr>
+              <a:t>Our compressive encoder was implemented with PCA with the number of components equal to the number of nodes in the autoencoder. This size was chosen because the autoencoder is performing an information reduction of similar order. </a:t>
             </a:r>
           </a:p>
           <a:p>
             <a:pPr algn="just"/>
             <a:r>
-              <a:rPr lang="en-US" sz="2700" dirty="0"/>
-              <a:t>Applying a compressive encoder, PCA, to the All Model gave reverse results. This is because features for the Gender Model are more distinct than the Smile Model features. These results would be excellent for reducing the accuracy of the </a:t>
-            </a:r>
-            <a:r>
-              <a:rPr lang="en-US" sz="2700" dirty="0"/>
-              <a:t>S</a:t>
-            </a:r>
-            <a:r>
-              <a:rPr lang="en-US" sz="2700" dirty="0" smtClean="0"/>
-              <a:t>mile</a:t>
-            </a:r>
-            <a:r>
-              <a:rPr lang="en-US" sz="2700" dirty="0" smtClean="0"/>
-              <a:t> </a:t>
-            </a:r>
-            <a:r>
-              <a:rPr lang="en-US" sz="2700" dirty="0"/>
-              <a:t>Model while </a:t>
-            </a:r>
-            <a:r>
-              <a:rPr lang="en-US" sz="2700" dirty="0" smtClean="0"/>
-              <a:t>not decreasing </a:t>
-            </a:r>
-            <a:r>
-              <a:rPr lang="en-US" sz="2700" dirty="0"/>
-              <a:t>the accuracy for the </a:t>
-            </a:r>
-            <a:r>
-              <a:rPr lang="en-US" sz="2700" dirty="0" smtClean="0"/>
-              <a:t>Gender</a:t>
-            </a:r>
-            <a:r>
-              <a:rPr lang="en-US" sz="2700" dirty="0" smtClean="0"/>
-              <a:t> </a:t>
-            </a:r>
-            <a:r>
-              <a:rPr lang="en-US" sz="2700" dirty="0"/>
-              <a:t>Model. </a:t>
+              <a:rPr lang="en-US" sz="2700" dirty="0">
+                <a:latin typeface="Lato" panose="020F0502020204030203" pitchFamily="34" charset="0"/>
+                <a:ea typeface="Lato" panose="020F0502020204030203" pitchFamily="34" charset="0"/>
+                <a:cs typeface="Lato" panose="020F0502020204030203" pitchFamily="34" charset="0"/>
+              </a:rPr>
+              <a:t>The features for the Gender Model are more distinct than the Smile Model features, which explains the PCA results because the algorithm is reducing information in a non-incentivized way. Due to the loss we defined for the autoencoder it is able to be equally effective while targeting specific features.</a:t>
             </a:r>
           </a:p>
         </p:txBody>
@@ -12771,7 +12575,7 @@
           <p:cNvPr id="19" name="TextBox 18">
             <a:extLst>
               <a:ext uri="{FF2B5EF4-FFF2-40B4-BE49-F238E27FC236}">
-                <a16:creationId xmlns:a16="http://schemas.microsoft.com/office/drawing/2014/main" xmlns="" id="{98DEF7AF-6476-4C50-A2AA-61370B95D23B}"/>
+                <a16:creationId xmlns:a16="http://schemas.microsoft.com/office/drawing/2014/main" id="{98DEF7AF-6476-4C50-A2AA-61370B95D23B}"/>
               </a:ext>
             </a:extLst>
           </p:cNvPr>
@@ -12799,8 +12603,12 @@
               <a:buAutoNum type="arabicPeriod"/>
             </a:pPr>
             <a:r>
-              <a:rPr lang="en-US" sz="2400" dirty="0"/>
-              <a:t>K-means compression algorithm to evaluate all three channels simultaneously.</a:t>
+              <a:rPr lang="en-US" sz="2400" dirty="0">
+                <a:latin typeface="Lato" panose="020F0502020204030203" pitchFamily="34" charset="0"/>
+                <a:ea typeface="Lato" panose="020F0502020204030203" pitchFamily="34" charset="0"/>
+                <a:cs typeface="Lato" panose="020F0502020204030203" pitchFamily="34" charset="0"/>
+              </a:rPr>
+              <a:t>K-means compression algorithm as an additional compressive encoder.</a:t>
             </a:r>
           </a:p>
           <a:p>
@@ -12809,7 +12617,11 @@
               <a:buAutoNum type="arabicPeriod"/>
             </a:pPr>
             <a:r>
-              <a:rPr lang="en-US" sz="2400" dirty="0"/>
+              <a:rPr lang="en-US" sz="2400" dirty="0">
+                <a:latin typeface="Lato" panose="020F0502020204030203" pitchFamily="34" charset="0"/>
+                <a:ea typeface="Lato" panose="020F0502020204030203" pitchFamily="34" charset="0"/>
+                <a:cs typeface="Lato" panose="020F0502020204030203" pitchFamily="34" charset="0"/>
+              </a:rPr>
               <a:t>More complex networks for classification.</a:t>
             </a:r>
           </a:p>
@@ -12819,8 +12631,12 @@
               <a:buAutoNum type="arabicPeriod"/>
             </a:pPr>
             <a:r>
-              <a:rPr lang="en-US" sz="2400" dirty="0"/>
-              <a:t>Loss function identification, to evaluate the loss function is achieving the true privacy measure desired.</a:t>
+              <a:rPr lang="en-US" sz="2400" dirty="0">
+                <a:latin typeface="Lato" panose="020F0502020204030203" pitchFamily="34" charset="0"/>
+                <a:ea typeface="Lato" panose="020F0502020204030203" pitchFamily="34" charset="0"/>
+                <a:cs typeface="Lato" panose="020F0502020204030203" pitchFamily="34" charset="0"/>
+              </a:rPr>
+              <a:t>Loss function identification, to verify the loss function is achieving the true privacy measure desired.</a:t>
             </a:r>
           </a:p>
           <a:p>
@@ -12829,8 +12645,12 @@
               <a:buAutoNum type="arabicPeriod"/>
             </a:pPr>
             <a:r>
-              <a:rPr lang="en-US" sz="2400" dirty="0"/>
-              <a:t>Add random noise to the encoder to make it non-reversible -limits the information to the classifiers.</a:t>
+              <a:rPr lang="en-US" sz="2400" dirty="0">
+                <a:latin typeface="Lato" panose="020F0502020204030203" pitchFamily="34" charset="0"/>
+                <a:ea typeface="Lato" panose="020F0502020204030203" pitchFamily="34" charset="0"/>
+                <a:cs typeface="Lato" panose="020F0502020204030203" pitchFamily="34" charset="0"/>
+              </a:rPr>
+              <a:t>Add random noise to the encoder to make it non-reversible, limits the information to the classifiers.</a:t>
             </a:r>
           </a:p>
         </p:txBody>
@@ -12840,7 +12660,7 @@
           <p:cNvPr id="51" name="Picture 50">
             <a:extLst>
               <a:ext uri="{FF2B5EF4-FFF2-40B4-BE49-F238E27FC236}">
-                <a16:creationId xmlns:a16="http://schemas.microsoft.com/office/drawing/2014/main" xmlns="" id="{026ED300-D5BF-456A-BAF3-858FD093D984}"/>
+                <a16:creationId xmlns:a16="http://schemas.microsoft.com/office/drawing/2014/main" id="{026ED300-D5BF-456A-BAF3-858FD093D984}"/>
               </a:ext>
             </a:extLst>
           </p:cNvPr>
@@ -12869,7 +12689,7 @@
           <p:cNvPr id="9" name="Picture 8">
             <a:extLst>
               <a:ext uri="{FF2B5EF4-FFF2-40B4-BE49-F238E27FC236}">
-                <a16:creationId xmlns:a16="http://schemas.microsoft.com/office/drawing/2014/main" xmlns="" id="{F3689EA3-1B83-4627-A36D-B51740384D20}"/>
+                <a16:creationId xmlns:a16="http://schemas.microsoft.com/office/drawing/2014/main" id="{F3689EA3-1B83-4627-A36D-B51740384D20}"/>
               </a:ext>
             </a:extLst>
           </p:cNvPr>
@@ -12899,7 +12719,7 @@
           <p:cNvPr id="10" name="TextBox 9">
             <a:extLst>
               <a:ext uri="{FF2B5EF4-FFF2-40B4-BE49-F238E27FC236}">
-                <a16:creationId xmlns:a16="http://schemas.microsoft.com/office/drawing/2014/main" xmlns="" id="{B6590A8D-629F-46AF-8B62-B4E06D5BA6D6}"/>
+                <a16:creationId xmlns:a16="http://schemas.microsoft.com/office/drawing/2014/main" id="{B6590A8D-629F-46AF-8B62-B4E06D5BA6D6}"/>
               </a:ext>
             </a:extLst>
           </p:cNvPr>
@@ -12934,7 +12754,7 @@
           <p:cNvPr id="12" name="Picture 11">
             <a:extLst>
               <a:ext uri="{FF2B5EF4-FFF2-40B4-BE49-F238E27FC236}">
-                <a16:creationId xmlns:a16="http://schemas.microsoft.com/office/drawing/2014/main" xmlns="" id="{4E996446-0C77-449A-8F35-858D828AD217}"/>
+                <a16:creationId xmlns:a16="http://schemas.microsoft.com/office/drawing/2014/main" id="{4E996446-0C77-449A-8F35-858D828AD217}"/>
               </a:ext>
             </a:extLst>
           </p:cNvPr>
@@ -12964,7 +12784,7 @@
           <p:cNvPr id="14" name="Picture 13">
             <a:extLst>
               <a:ext uri="{FF2B5EF4-FFF2-40B4-BE49-F238E27FC236}">
-                <a16:creationId xmlns:a16="http://schemas.microsoft.com/office/drawing/2014/main" xmlns="" id="{7C88825A-77FD-43DB-8F55-9608A5172700}"/>
+                <a16:creationId xmlns:a16="http://schemas.microsoft.com/office/drawing/2014/main" id="{7C88825A-77FD-43DB-8F55-9608A5172700}"/>
               </a:ext>
             </a:extLst>
           </p:cNvPr>
@@ -12994,7 +12814,7 @@
           <p:cNvPr id="20" name="Picture 19">
             <a:extLst>
               <a:ext uri="{FF2B5EF4-FFF2-40B4-BE49-F238E27FC236}">
-                <a16:creationId xmlns:a16="http://schemas.microsoft.com/office/drawing/2014/main" xmlns="" id="{17D18A3B-B5BF-4025-8A62-250D6BF60464}"/>
+                <a16:creationId xmlns:a16="http://schemas.microsoft.com/office/drawing/2014/main" id="{17D18A3B-B5BF-4025-8A62-250D6BF60464}"/>
               </a:ext>
             </a:extLst>
           </p:cNvPr>
@@ -13024,7 +12844,7 @@
           <p:cNvPr id="23" name="Picture 22">
             <a:extLst>
               <a:ext uri="{FF2B5EF4-FFF2-40B4-BE49-F238E27FC236}">
-                <a16:creationId xmlns:a16="http://schemas.microsoft.com/office/drawing/2014/main" xmlns="" id="{328E86F7-D73F-42D3-AE6D-58856ABC2BDB}"/>
+                <a16:creationId xmlns:a16="http://schemas.microsoft.com/office/drawing/2014/main" id="{328E86F7-D73F-42D3-AE6D-58856ABC2BDB}"/>
               </a:ext>
             </a:extLst>
           </p:cNvPr>
@@ -13054,7 +12874,7 @@
           <p:cNvPr id="24" name="TextBox 23">
             <a:extLst>
               <a:ext uri="{FF2B5EF4-FFF2-40B4-BE49-F238E27FC236}">
-                <a16:creationId xmlns:a16="http://schemas.microsoft.com/office/drawing/2014/main" xmlns="" id="{DFB4F5CA-50D0-4FF6-BA93-B0731DF60E2E}"/>
+                <a16:creationId xmlns:a16="http://schemas.microsoft.com/office/drawing/2014/main" id="{DFB4F5CA-50D0-4FF6-BA93-B0731DF60E2E}"/>
               </a:ext>
             </a:extLst>
           </p:cNvPr>
@@ -13079,12 +12899,20 @@
           <a:p>
             <a:pPr algn="ctr"/>
             <a:r>
-              <a:rPr lang="en-US" sz="2600" dirty="0"/>
+              <a:rPr lang="en-US" sz="2600" dirty="0">
+                <a:latin typeface="Lato" panose="020F0502020204030203" pitchFamily="34" charset="0"/>
+                <a:ea typeface="Lato" panose="020F0502020204030203" pitchFamily="34" charset="0"/>
+                <a:cs typeface="Lato" panose="020F0502020204030203" pitchFamily="34" charset="0"/>
+              </a:rPr>
               <a:t>Gender Accuracy</a:t>
             </a:r>
           </a:p>
           <a:p>
-            <a:endParaRPr lang="en-US" dirty="0"/>
+            <a:endParaRPr lang="en-US" dirty="0">
+              <a:latin typeface="Lato" panose="020F0502020204030203" pitchFamily="34" charset="0"/>
+              <a:ea typeface="Lato" panose="020F0502020204030203" pitchFamily="34" charset="0"/>
+              <a:cs typeface="Lato" panose="020F0502020204030203" pitchFamily="34" charset="0"/>
+            </a:endParaRPr>
           </a:p>
         </p:txBody>
       </p:sp>
@@ -13093,7 +12921,7 @@
           <p:cNvPr id="48" name="TextBox 47">
             <a:extLst>
               <a:ext uri="{FF2B5EF4-FFF2-40B4-BE49-F238E27FC236}">
-                <a16:creationId xmlns:a16="http://schemas.microsoft.com/office/drawing/2014/main" xmlns="" id="{50A384EF-2519-4C45-972C-4C74A5FCF03B}"/>
+                <a16:creationId xmlns:a16="http://schemas.microsoft.com/office/drawing/2014/main" id="{50A384EF-2519-4C45-972C-4C74A5FCF03B}"/>
               </a:ext>
             </a:extLst>
           </p:cNvPr>
@@ -13118,12 +12946,20 @@
           <a:p>
             <a:pPr algn="ctr"/>
             <a:r>
-              <a:rPr lang="en-US" sz="2600" dirty="0"/>
+              <a:rPr lang="en-US" sz="2600" dirty="0">
+                <a:latin typeface="Lato" panose="020F0502020204030203" pitchFamily="34" charset="0"/>
+                <a:ea typeface="Lato" panose="020F0502020204030203" pitchFamily="34" charset="0"/>
+                <a:cs typeface="Lato" panose="020F0502020204030203" pitchFamily="34" charset="0"/>
+              </a:rPr>
               <a:t>Smile Accuracy</a:t>
             </a:r>
           </a:p>
           <a:p>
-            <a:endParaRPr lang="en-US" dirty="0"/>
+            <a:endParaRPr lang="en-US" dirty="0">
+              <a:latin typeface="Lato" panose="020F0502020204030203" pitchFamily="34" charset="0"/>
+              <a:ea typeface="Lato" panose="020F0502020204030203" pitchFamily="34" charset="0"/>
+              <a:cs typeface="Lato" panose="020F0502020204030203" pitchFamily="34" charset="0"/>
+            </a:endParaRPr>
           </a:p>
         </p:txBody>
       </p:sp>
@@ -13132,7 +12968,7 @@
           <p:cNvPr id="49" name="TextBox 48">
             <a:extLst>
               <a:ext uri="{FF2B5EF4-FFF2-40B4-BE49-F238E27FC236}">
-                <a16:creationId xmlns:a16="http://schemas.microsoft.com/office/drawing/2014/main" xmlns="" id="{865764A4-5670-4E83-9746-8C5DCC498B3A}"/>
+                <a16:creationId xmlns:a16="http://schemas.microsoft.com/office/drawing/2014/main" id="{865764A4-5670-4E83-9746-8C5DCC498B3A}"/>
               </a:ext>
             </a:extLst>
           </p:cNvPr>
@@ -13157,12 +12993,20 @@
           <a:p>
             <a:pPr algn="ctr"/>
             <a:r>
-              <a:rPr lang="en-US" sz="2600" dirty="0"/>
+              <a:rPr lang="en-US" sz="2600" dirty="0">
+                <a:latin typeface="Lato" panose="020F0502020204030203" pitchFamily="34" charset="0"/>
+                <a:ea typeface="Lato" panose="020F0502020204030203" pitchFamily="34" charset="0"/>
+                <a:cs typeface="Lato" panose="020F0502020204030203" pitchFamily="34" charset="0"/>
+              </a:rPr>
               <a:t>Gender Loss</a:t>
             </a:r>
           </a:p>
           <a:p>
-            <a:endParaRPr lang="en-US" dirty="0"/>
+            <a:endParaRPr lang="en-US" dirty="0">
+              <a:latin typeface="Lato" panose="020F0502020204030203" pitchFamily="34" charset="0"/>
+              <a:ea typeface="Lato" panose="020F0502020204030203" pitchFamily="34" charset="0"/>
+              <a:cs typeface="Lato" panose="020F0502020204030203" pitchFamily="34" charset="0"/>
+            </a:endParaRPr>
           </a:p>
         </p:txBody>
       </p:sp>
@@ -13171,7 +13015,7 @@
           <p:cNvPr id="50" name="TextBox 49">
             <a:extLst>
               <a:ext uri="{FF2B5EF4-FFF2-40B4-BE49-F238E27FC236}">
-                <a16:creationId xmlns:a16="http://schemas.microsoft.com/office/drawing/2014/main" xmlns="" id="{A6BBBB29-9E5F-4BF4-8396-E65F948879F5}"/>
+                <a16:creationId xmlns:a16="http://schemas.microsoft.com/office/drawing/2014/main" id="{A6BBBB29-9E5F-4BF4-8396-E65F948879F5}"/>
               </a:ext>
             </a:extLst>
           </p:cNvPr>
@@ -13196,12 +13040,20 @@
           <a:p>
             <a:pPr algn="ctr"/>
             <a:r>
-              <a:rPr lang="en-US" sz="2600" dirty="0"/>
+              <a:rPr lang="en-US" sz="2600" dirty="0">
+                <a:latin typeface="Lato" panose="020F0502020204030203" pitchFamily="34" charset="0"/>
+                <a:ea typeface="Lato" panose="020F0502020204030203" pitchFamily="34" charset="0"/>
+                <a:cs typeface="Lato" panose="020F0502020204030203" pitchFamily="34" charset="0"/>
+              </a:rPr>
               <a:t>Smile Loss</a:t>
             </a:r>
           </a:p>
           <a:p>
-            <a:endParaRPr lang="en-US" dirty="0"/>
+            <a:endParaRPr lang="en-US" dirty="0">
+              <a:latin typeface="Lato" panose="020F0502020204030203" pitchFamily="34" charset="0"/>
+              <a:ea typeface="Lato" panose="020F0502020204030203" pitchFamily="34" charset="0"/>
+              <a:cs typeface="Lato" panose="020F0502020204030203" pitchFamily="34" charset="0"/>
+            </a:endParaRPr>
           </a:p>
         </p:txBody>
       </p:sp>
@@ -13210,7 +13062,7 @@
           <p:cNvPr id="6" name="Table 5">
             <a:extLst>
               <a:ext uri="{FF2B5EF4-FFF2-40B4-BE49-F238E27FC236}">
-                <a16:creationId xmlns:a16="http://schemas.microsoft.com/office/drawing/2014/main" xmlns="" id="{DA536D49-4056-4BE2-9F3B-9D17AA50314C}"/>
+                <a16:creationId xmlns:a16="http://schemas.microsoft.com/office/drawing/2014/main" id="{DA536D49-4056-4BE2-9F3B-9D17AA50314C}"/>
               </a:ext>
             </a:extLst>
           </p:cNvPr>
@@ -13220,13 +13072,13 @@
           <p:nvPr>
             <p:extLst>
               <p:ext uri="{D42A27DB-BD31-4B8C-83A1-F6EECF244321}">
-                <p14:modId xmlns:p14="http://schemas.microsoft.com/office/powerpoint/2010/main" val="3096164053"/>
+                <p14:modId xmlns:p14="http://schemas.microsoft.com/office/powerpoint/2010/main" val="841455894"/>
               </p:ext>
             </p:extLst>
           </p:nvPr>
         </p:nvGraphicFramePr>
         <p:xfrm>
-          <a:off x="16793149" y="4822669"/>
+          <a:off x="16793149" y="4790585"/>
           <a:ext cx="14456523" cy="2072640"/>
         </p:xfrm>
         <a:graphic>
@@ -13239,28 +13091,28 @@
                 <a:gridCol w="3614131">
                   <a:extLst>
                     <a:ext uri="{9D8B030D-6E8A-4147-A177-3AD203B41FA5}">
-                      <a16:colId xmlns:a16="http://schemas.microsoft.com/office/drawing/2014/main" xmlns="" val="1053403163"/>
+                      <a16:colId xmlns:a16="http://schemas.microsoft.com/office/drawing/2014/main" val="1053403163"/>
                     </a:ext>
                   </a:extLst>
                 </a:gridCol>
                 <a:gridCol w="3426384">
                   <a:extLst>
                     <a:ext uri="{9D8B030D-6E8A-4147-A177-3AD203B41FA5}">
-                      <a16:colId xmlns:a16="http://schemas.microsoft.com/office/drawing/2014/main" xmlns="" val="3090555624"/>
+                      <a16:colId xmlns:a16="http://schemas.microsoft.com/office/drawing/2014/main" val="3090555624"/>
                     </a:ext>
                   </a:extLst>
                 </a:gridCol>
                 <a:gridCol w="3801877">
                   <a:extLst>
                     <a:ext uri="{9D8B030D-6E8A-4147-A177-3AD203B41FA5}">
-                      <a16:colId xmlns:a16="http://schemas.microsoft.com/office/drawing/2014/main" xmlns="" val="433866479"/>
+                      <a16:colId xmlns:a16="http://schemas.microsoft.com/office/drawing/2014/main" val="433866479"/>
                     </a:ext>
                   </a:extLst>
                 </a:gridCol>
                 <a:gridCol w="3614131">
                   <a:extLst>
                     <a:ext uri="{9D8B030D-6E8A-4147-A177-3AD203B41FA5}">
-                      <a16:colId xmlns:a16="http://schemas.microsoft.com/office/drawing/2014/main" xmlns="" val="2192480138"/>
+                      <a16:colId xmlns:a16="http://schemas.microsoft.com/office/drawing/2014/main" val="2192480138"/>
                     </a:ext>
                   </a:extLst>
                 </a:gridCol>
@@ -13292,7 +13144,7 @@
                       <a:pPr algn="ctr"/>
                       <a:r>
                         <a:rPr lang="en-US" sz="2800" dirty="0"/>
-                        <a:t>All Model</a:t>
+                        <a:t>GAN Accuracy</a:t>
                       </a:r>
                       <a:endParaRPr lang="en-US" sz="2800" dirty="0">
                         <a:solidFill>
@@ -13318,7 +13170,7 @@
                       <a:pPr algn="ctr"/>
                       <a:r>
                         <a:rPr lang="en-US" sz="2800" dirty="0"/>
-                        <a:t>Gender Model</a:t>
+                        <a:t>Gender Accuracy</a:t>
                       </a:r>
                       <a:endParaRPr lang="en-US" sz="2800" dirty="0">
                         <a:solidFill>
@@ -13344,7 +13196,7 @@
                       <a:pPr algn="ctr"/>
                       <a:r>
                         <a:rPr lang="en-US" sz="2800" dirty="0"/>
-                        <a:t>Smile Model</a:t>
+                        <a:t>Smile Accuracy</a:t>
                       </a:r>
                       <a:endParaRPr lang="en-US" sz="2800" dirty="0">
                         <a:solidFill>
@@ -13364,7 +13216,7 @@
                 </a:tc>
                 <a:extLst>
                   <a:ext uri="{0D108BD9-81ED-4DB2-BD59-A6C34878D82A}">
-                    <a16:rowId xmlns:a16="http://schemas.microsoft.com/office/drawing/2014/main" xmlns="" val="1971175034"/>
+                    <a16:rowId xmlns:a16="http://schemas.microsoft.com/office/drawing/2014/main" val="1971175034"/>
                   </a:ext>
                 </a:extLst>
               </a:tr>
@@ -13377,7 +13229,7 @@
                       <a:pPr algn="l"/>
                       <a:r>
                         <a:rPr lang="en-US" sz="2800" dirty="0"/>
-                        <a:t>No Train</a:t>
+                        <a:t>Autoencoder</a:t>
                       </a:r>
                     </a:p>
                   </a:txBody>
@@ -13434,7 +13286,7 @@
                 </a:tc>
                 <a:extLst>
                   <a:ext uri="{0D108BD9-81ED-4DB2-BD59-A6C34878D82A}">
-                    <a16:rowId xmlns:a16="http://schemas.microsoft.com/office/drawing/2014/main" xmlns="" val="2849221002"/>
+                    <a16:rowId xmlns:a16="http://schemas.microsoft.com/office/drawing/2014/main" val="2849221002"/>
                   </a:ext>
                 </a:extLst>
               </a:tr>
@@ -13504,7 +13356,7 @@
                 </a:tc>
                 <a:extLst>
                   <a:ext uri="{0D108BD9-81ED-4DB2-BD59-A6C34878D82A}">
-                    <a16:rowId xmlns:a16="http://schemas.microsoft.com/office/drawing/2014/main" xmlns="" val="3133074252"/>
+                    <a16:rowId xmlns:a16="http://schemas.microsoft.com/office/drawing/2014/main" val="3133074252"/>
                   </a:ext>
                 </a:extLst>
               </a:tr>
@@ -13573,7 +13425,7 @@
                 </a:tc>
                 <a:extLst>
                   <a:ext uri="{0D108BD9-81ED-4DB2-BD59-A6C34878D82A}">
-                    <a16:rowId xmlns:a16="http://schemas.microsoft.com/office/drawing/2014/main" xmlns="" val="1825464888"/>
+                    <a16:rowId xmlns:a16="http://schemas.microsoft.com/office/drawing/2014/main" val="1825464888"/>
                   </a:ext>
                 </a:extLst>
               </a:tr>

</xml_diff>